<commit_message>
wide version of feedback poster added.
</commit_message>
<xml_diff>
--- a/Posters/Feedback Poster.pptx
+++ b/Posters/Feedback Poster.pptx
@@ -4054,10 +4054,10 @@
       </p:grpSpPr>
       <p:pic>
         <p:nvPicPr>
-          <p:cNvPr id="23" name="Picture 22" descr="Chart, line chart&#10;&#10;Description automatically generated">
+          <p:cNvPr id="29" name="Picture 28" descr="Chart&#10;&#10;Description automatically generated with low confidence">
             <a:extLst>
               <a:ext uri="{FF2B5EF4-FFF2-40B4-BE49-F238E27FC236}">
-                <a16:creationId xmlns:a16="http://schemas.microsoft.com/office/drawing/2014/main" id="{352E4D97-7B2D-40C9-9552-5CB34B5372D2}"/>
+                <a16:creationId xmlns:a16="http://schemas.microsoft.com/office/drawing/2014/main" id="{6C0A1507-2C9F-479E-8DCF-BF61E14E0E08}"/>
               </a:ext>
             </a:extLst>
           </p:cNvPr>
@@ -4074,118 +4074,13 @@
               </a:ext>
             </a:extLst>
           </a:blip>
-          <a:srcRect r="8824"/>
-          <a:stretch/>
-        </p:blipFill>
-        <p:spPr>
-          <a:xfrm>
-            <a:off x="13289226" y="23418367"/>
-            <a:ext cx="8326084" cy="4524315"/>
-          </a:xfrm>
-          <a:prstGeom prst="rect">
-            <a:avLst/>
-          </a:prstGeom>
-        </p:spPr>
-      </p:pic>
-      <p:pic>
-        <p:nvPicPr>
-          <p:cNvPr id="25" name="Picture 24" descr="Chart, histogram&#10;&#10;Description automatically generated">
-            <a:extLst>
-              <a:ext uri="{FF2B5EF4-FFF2-40B4-BE49-F238E27FC236}">
-                <a16:creationId xmlns:a16="http://schemas.microsoft.com/office/drawing/2014/main" id="{8DAE1EF0-CC5A-40D8-AD49-0E4E489D66BC}"/>
-              </a:ext>
-            </a:extLst>
-          </p:cNvPr>
-          <p:cNvPicPr>
-            <a:picLocks noChangeAspect="1"/>
-          </p:cNvPicPr>
-          <p:nvPr/>
-        </p:nvPicPr>
-        <p:blipFill rotWithShape="1">
-          <a:blip r:embed="rId4">
-            <a:extLst>
-              <a:ext uri="{28A0092B-C50C-407E-A947-70E740481C1C}">
-                <a14:useLocalDpi xmlns:a14="http://schemas.microsoft.com/office/drawing/2010/main" val="0"/>
-              </a:ext>
-            </a:extLst>
-          </a:blip>
-          <a:srcRect l="4620"/>
-          <a:stretch/>
-        </p:blipFill>
-        <p:spPr>
-          <a:xfrm>
-            <a:off x="21557741" y="23391682"/>
-            <a:ext cx="9069867" cy="4711252"/>
-          </a:xfrm>
-          <a:prstGeom prst="rect">
-            <a:avLst/>
-          </a:prstGeom>
-        </p:spPr>
-      </p:pic>
-      <p:pic>
-        <p:nvPicPr>
-          <p:cNvPr id="29" name="Picture 28" descr="Chart&#10;&#10;Description automatically generated with low confidence">
-            <a:extLst>
-              <a:ext uri="{FF2B5EF4-FFF2-40B4-BE49-F238E27FC236}">
-                <a16:creationId xmlns:a16="http://schemas.microsoft.com/office/drawing/2014/main" id="{6C0A1507-2C9F-479E-8DCF-BF61E14E0E08}"/>
-              </a:ext>
-            </a:extLst>
-          </p:cNvPr>
-          <p:cNvPicPr>
-            <a:picLocks noChangeAspect="1"/>
-          </p:cNvPicPr>
-          <p:nvPr/>
-        </p:nvPicPr>
-        <p:blipFill rotWithShape="1">
-          <a:blip r:embed="rId5">
-            <a:extLst>
-              <a:ext uri="{28A0092B-C50C-407E-A947-70E740481C1C}">
-                <a14:useLocalDpi xmlns:a14="http://schemas.microsoft.com/office/drawing/2010/main" val="0"/>
-              </a:ext>
-            </a:extLst>
-          </a:blip>
           <a:srcRect r="7587"/>
           <a:stretch/>
         </p:blipFill>
         <p:spPr>
           <a:xfrm>
-            <a:off x="36072880" y="15820409"/>
+            <a:off x="36112424" y="15224750"/>
             <a:ext cx="7500630" cy="4130050"/>
-          </a:xfrm>
-          <a:prstGeom prst="rect">
-            <a:avLst/>
-          </a:prstGeom>
-        </p:spPr>
-      </p:pic>
-      <p:pic>
-        <p:nvPicPr>
-          <p:cNvPr id="21" name="Picture 20" descr="Chart, line chart&#10;&#10;Description automatically generated">
-            <a:extLst>
-              <a:ext uri="{FF2B5EF4-FFF2-40B4-BE49-F238E27FC236}">
-                <a16:creationId xmlns:a16="http://schemas.microsoft.com/office/drawing/2014/main" id="{4E0AF005-610F-4823-A87B-FC76F0859D76}"/>
-              </a:ext>
-            </a:extLst>
-          </p:cNvPr>
-          <p:cNvPicPr>
-            <a:picLocks noChangeAspect="1"/>
-          </p:cNvPicPr>
-          <p:nvPr/>
-        </p:nvPicPr>
-        <p:blipFill rotWithShape="1">
-          <a:blip r:embed="rId6">
-            <a:extLst>
-              <a:ext uri="{28A0092B-C50C-407E-A947-70E740481C1C}">
-                <a14:useLocalDpi xmlns:a14="http://schemas.microsoft.com/office/drawing/2010/main" val="0"/>
-              </a:ext>
-            </a:extLst>
-          </a:blip>
-          <a:srcRect r="8824"/>
-          <a:stretch/>
-        </p:blipFill>
-        <p:spPr>
-          <a:xfrm>
-            <a:off x="13286980" y="28092636"/>
-            <a:ext cx="8326084" cy="4524315"/>
           </a:xfrm>
           <a:prstGeom prst="rect">
             <a:avLst/>
@@ -4207,7 +4102,7 @@
           <p:nvPr/>
         </p:nvPicPr>
         <p:blipFill rotWithShape="1">
-          <a:blip r:embed="rId7">
+          <a:blip r:embed="rId4">
             <a:extLst>
               <a:ext uri="{28A0092B-C50C-407E-A947-70E740481C1C}">
                 <a14:useLocalDpi xmlns:a14="http://schemas.microsoft.com/office/drawing/2010/main" val="0"/>
@@ -4219,7 +4114,7 @@
         </p:blipFill>
         <p:spPr>
           <a:xfrm>
-            <a:off x="29583401" y="15954869"/>
+            <a:off x="29624501" y="15341359"/>
             <a:ext cx="6979832" cy="3844643"/>
           </a:xfrm>
           <a:prstGeom prst="rect">
@@ -4239,8 +4134,8 @@
         </p:nvSpPr>
         <p:spPr>
           <a:xfrm>
-            <a:off x="6927136" y="359730"/>
-            <a:ext cx="30379360" cy="3396243"/>
+            <a:off x="10336352" y="400140"/>
+            <a:ext cx="22897582" cy="3396243"/>
           </a:xfrm>
         </p:spPr>
         <p:txBody>
@@ -4248,143 +4143,51 @@
           <a:lstStyle/>
           <a:p>
             <a:r>
-              <a:rPr lang="en-US" sz="6000" b="1" dirty="0"/>
-              <a:t>Tracking COVID-19 by Incorporating Feedback into the SIRD Model</a:t>
+              <a:rPr lang="en-US" sz="6600" b="1" dirty="0"/>
+              <a:t>A Feedback SIRD Model  for the Spread of Infectious Disease with Application to COVID-19 Pandemic</a:t>
+            </a:r>
+            <a:br>
+              <a:rPr lang="en-US" sz="5400" dirty="0"/>
+            </a:br>
+            <a:r>
+              <a:rPr lang="en-US" sz="4800" dirty="0"/>
+              <a:t>Daniel March, </a:t>
+            </a:r>
+            <a:r>
+              <a:rPr lang="en-US" sz="4800" dirty="0" err="1"/>
+              <a:t>Jeston</a:t>
+            </a:r>
+            <a:r>
+              <a:rPr lang="en-US" sz="4800" dirty="0"/>
+              <a:t> Bond, and </a:t>
+            </a:r>
+            <a:r>
+              <a:rPr lang="en-US" sz="4800" dirty="0" err="1"/>
+              <a:t>Genti</a:t>
+            </a:r>
+            <a:r>
+              <a:rPr lang="en-US" sz="4800" dirty="0"/>
+              <a:t> </a:t>
+            </a:r>
+            <a:r>
+              <a:rPr lang="en-US" sz="4800" dirty="0" err="1"/>
+              <a:t>Buzi</a:t>
             </a:r>
             <a:br>
               <a:rPr lang="en-US" sz="4800" dirty="0"/>
             </a:br>
             <a:r>
-              <a:rPr lang="en-US" sz="4400" dirty="0"/>
-              <a:t>Daniel March</a:t>
-            </a:r>
-            <a:r>
-              <a:rPr lang="en-US" sz="4400" baseline="30000" dirty="0"/>
-              <a:t>1</a:t>
-            </a:r>
-            <a:r>
-              <a:rPr lang="en-US" sz="4400" dirty="0"/>
-              <a:t>, </a:t>
-            </a:r>
-            <a:r>
-              <a:rPr lang="en-US" sz="4400" dirty="0" err="1"/>
-              <a:t>Jeston</a:t>
-            </a:r>
-            <a:r>
-              <a:rPr lang="en-US" sz="4400" dirty="0"/>
-              <a:t> Bond</a:t>
-            </a:r>
-            <a:r>
-              <a:rPr lang="en-US" sz="4400" baseline="30000" dirty="0"/>
-              <a:t>1</a:t>
-            </a:r>
-            <a:r>
-              <a:rPr lang="en-US" sz="4400" dirty="0"/>
-              <a:t>, and </a:t>
-            </a:r>
-            <a:r>
-              <a:rPr lang="en-US" sz="4400" dirty="0" err="1"/>
-              <a:t>Genti</a:t>
-            </a:r>
-            <a:r>
-              <a:rPr lang="en-US" sz="4400" dirty="0"/>
-              <a:t> Buzi</a:t>
-            </a:r>
-            <a:r>
-              <a:rPr lang="en-US" sz="4400" baseline="30000" dirty="0"/>
-              <a:t>1</a:t>
-            </a:r>
-            <a:br>
-              <a:rPr lang="en-US" sz="4400" dirty="0"/>
-            </a:br>
-            <a:r>
-              <a:rPr lang="en-US" sz="4400" baseline="30000" dirty="0"/>
-              <a:t>1</a:t>
-            </a:r>
-            <a:r>
-              <a:rPr lang="en-US" sz="4400" dirty="0"/>
-              <a:t>Department of Mathematics and Computer Science, Biola University</a:t>
-            </a:r>
-            <a:br>
-              <a:rPr lang="en-US" sz="4400" dirty="0"/>
-            </a:br>
-            <a:r>
-              <a:rPr lang="en-US" sz="4400" baseline="30000" dirty="0"/>
-              <a:t>2</a:t>
-            </a:r>
-            <a:r>
-              <a:rPr lang="en-US" sz="4400" dirty="0"/>
-              <a:t>Department of Kinesiology and Public Health, Biola University</a:t>
-            </a:r>
-          </a:p>
-        </p:txBody>
-      </p:sp>
-      <p:sp>
-        <p:nvSpPr>
-          <p:cNvPr id="1030" name="Content Placeholder 5"/>
-          <p:cNvSpPr>
-            <a:spLocks noGrp="1"/>
-          </p:cNvSpPr>
-          <p:nvPr>
-            <p:ph sz="half" idx="2"/>
-          </p:nvPr>
-        </p:nvSpPr>
-        <p:spPr>
-          <a:xfrm>
-            <a:off x="122963" y="5389201"/>
-            <a:ext cx="14597742" cy="6482323"/>
-          </a:xfrm>
-        </p:spPr>
-        <p:txBody>
-          <a:bodyPr/>
-          <a:lstStyle/>
-          <a:p>
-            <a:pPr marL="0" indent="0" defTabSz="3574551" eaLnBrk="1" hangingPunct="1">
-              <a:spcBef>
-                <a:spcPts val="0"/>
-              </a:spcBef>
-              <a:spcAft>
-                <a:spcPts val="0"/>
-              </a:spcAft>
-              <a:buNone/>
-              <a:defRPr/>
-            </a:pPr>
-            <a:r>
-              <a:rPr lang="en-US" sz="3200" dirty="0">
-                <a:cs typeface="Arial" pitchFamily="34" charset="0"/>
-              </a:rPr>
-              <a:t>The COVID-19 global pandemic has highlighted the importance of identifying effective ways to control the spread of an infectious disease in a population. A solid understanding of the dynamics and the underlying mechanisms that govern this spread is an important step toward such a goal. Susceptible-Infected-Recovered (SIR) type models have played an important role in providing such insight. However, these models have limited explanatory and predictive power due to policy and behavior changes over time, usually in response to the intensity of the spread of the infection.  Here we present a modified version of the standard SIR models by introducing feedback in the disease transmission rate.  We apply this model to the publicly available COVID-19 US and international infection data.   We show that this model is more robust to parameter variations due to public health interventions and has much better explanatory and predictive power.</a:t>
-            </a:r>
-          </a:p>
-          <a:p>
-            <a:pPr marL="0" indent="0" defTabSz="3574551" eaLnBrk="1" hangingPunct="1">
-              <a:spcBef>
-                <a:spcPts val="0"/>
-              </a:spcBef>
-              <a:spcAft>
-                <a:spcPts val="0"/>
-              </a:spcAft>
-              <a:buNone/>
-              <a:defRPr/>
-            </a:pPr>
-            <a:endParaRPr lang="en-US" sz="3200" dirty="0">
-              <a:cs typeface="Arial" pitchFamily="34" charset="0"/>
-            </a:endParaRPr>
-          </a:p>
-          <a:p>
-            <a:pPr marL="0" indent="0" defTabSz="3574551" eaLnBrk="1" hangingPunct="1">
-              <a:spcBef>
-                <a:spcPts val="0"/>
-              </a:spcBef>
-              <a:spcAft>
-                <a:spcPts val="0"/>
-              </a:spcAft>
-              <a:buNone/>
-              <a:defRPr/>
-            </a:pPr>
-            <a:endParaRPr lang="en-US" sz="3200" dirty="0">
-              <a:cs typeface="Arial" pitchFamily="34" charset="0"/>
-            </a:endParaRPr>
+              <a:rPr lang="en-US" sz="4800" dirty="0"/>
+              <a:t>Department of Mathematics and Computer Science, </a:t>
+            </a:r>
+            <a:r>
+              <a:rPr lang="en-US" sz="4800" dirty="0" err="1"/>
+              <a:t>Biola</a:t>
+            </a:r>
+            <a:r>
+              <a:rPr lang="en-US" sz="4800" dirty="0"/>
+              <a:t> University</a:t>
+            </a:r>
           </a:p>
         </p:txBody>
       </p:sp>
@@ -4516,7 +4319,7 @@
           <p:nvPr/>
         </p:nvPicPr>
         <p:blipFill rotWithShape="1">
-          <a:blip r:embed="rId8">
+          <a:blip r:embed="rId5">
             <a:extLst>
               <a:ext uri="{28A0092B-C50C-407E-A947-70E740481C1C}">
                 <a14:useLocalDpi xmlns:a14="http://schemas.microsoft.com/office/drawing/2010/main" val="0"/>
@@ -4555,7 +4358,7 @@
           <p:nvPr/>
         </p:nvPicPr>
         <p:blipFill>
-          <a:blip r:embed="rId9" cstate="print">
+          <a:blip r:embed="rId6" cstate="print">
             <a:extLst>
               <a:ext uri="{28A0092B-C50C-407E-A947-70E740481C1C}">
                 <a14:useLocalDpi xmlns:a14="http://schemas.microsoft.com/office/drawing/2010/main" val="0"/>
@@ -4584,7 +4387,7 @@
         </p:nvSpPr>
         <p:spPr>
           <a:xfrm>
-            <a:off x="399945" y="11931046"/>
+            <a:off x="497043" y="11931046"/>
             <a:ext cx="13627351" cy="833984"/>
           </a:xfrm>
           <a:prstGeom prst="roundRect">
@@ -4629,7 +4432,7 @@
         </p:nvSpPr>
         <p:spPr bwMode="auto">
           <a:xfrm>
-            <a:off x="119650" y="20678528"/>
+            <a:off x="497043" y="20617248"/>
             <a:ext cx="3775485" cy="772092"/>
           </a:xfrm>
           <a:prstGeom prst="rect">
@@ -4662,57 +4465,6 @@
                 <a:latin typeface="Calibri" pitchFamily="34" charset="0"/>
               </a:rPr>
               <a:t>SIRD Model</a:t>
-            </a:r>
-          </a:p>
-        </p:txBody>
-      </p:sp>
-      <p:sp>
-        <p:nvSpPr>
-          <p:cNvPr id="58" name="Content Placeholder 5"/>
-          <p:cNvSpPr>
-            <a:spLocks noGrp="1"/>
-          </p:cNvSpPr>
-          <p:nvPr>
-            <p:ph sz="half" idx="2"/>
-          </p:nvPr>
-        </p:nvSpPr>
-        <p:spPr>
-          <a:xfrm>
-            <a:off x="40197" y="28481033"/>
-            <a:ext cx="9279945" cy="3279492"/>
-          </a:xfrm>
-        </p:spPr>
-        <p:txBody>
-          <a:bodyPr/>
-          <a:lstStyle/>
-          <a:p>
-            <a:pPr marL="0" indent="0" defTabSz="3574551" eaLnBrk="1" hangingPunct="1">
-              <a:spcBef>
-                <a:spcPts val="0"/>
-              </a:spcBef>
-              <a:spcAft>
-                <a:spcPts val="0"/>
-              </a:spcAft>
-              <a:buNone/>
-              <a:defRPr/>
-            </a:pPr>
-            <a:r>
-              <a:rPr lang="en-US" sz="3200" dirty="0">
-                <a:cs typeface="Arial" pitchFamily="34" charset="0"/>
-              </a:rPr>
-              <a:t>The transmission rate is replaced by a time varying beta based on the number of current infections after some delay </a:t>
-            </a:r>
-            <a:r>
-              <a:rPr lang="en-US" sz="3200" i="1" dirty="0">
-                <a:cs typeface="Arial" pitchFamily="34" charset="0"/>
-              </a:rPr>
-              <a:t>s </a:t>
-            </a:r>
-            <a:r>
-              <a:rPr lang="en-US" sz="3200" dirty="0">
-                <a:cs typeface="Arial" pitchFamily="34" charset="0"/>
-              </a:rPr>
-              <a:t>(normally s=14). The nonlinear variables are solved by gridding and are positive.</a:t>
             </a:r>
           </a:p>
         </p:txBody>
@@ -4801,7 +4553,7 @@
         </p:nvSpPr>
         <p:spPr bwMode="auto">
           <a:xfrm>
-            <a:off x="122963" y="12927543"/>
+            <a:off x="497043" y="12942927"/>
             <a:ext cx="8402843" cy="772092"/>
           </a:xfrm>
           <a:prstGeom prst="rect">
@@ -4889,7 +4641,7 @@
         </p:nvSpPr>
         <p:spPr>
           <a:xfrm>
-            <a:off x="29858106" y="20349616"/>
+            <a:off x="29858106" y="20116800"/>
             <a:ext cx="13627351" cy="833984"/>
           </a:xfrm>
           <a:prstGeom prst="roundRect">
@@ -4977,8 +4729,8 @@
         </p:nvSpPr>
         <p:spPr bwMode="auto">
           <a:xfrm>
-            <a:off x="14376118" y="5707194"/>
-            <a:ext cx="10727651" cy="772092"/>
+            <a:off x="14971468" y="5650615"/>
+            <a:ext cx="10432218" cy="772092"/>
           </a:xfrm>
           <a:prstGeom prst="rect">
             <a:avLst/>
@@ -5022,8 +4774,8 @@
         </p:nvSpPr>
         <p:spPr>
           <a:xfrm>
-            <a:off x="480114" y="13662507"/>
-            <a:ext cx="13627350" cy="6001643"/>
+            <a:off x="399945" y="13723977"/>
+            <a:ext cx="13724449" cy="5478423"/>
           </a:xfrm>
           <a:prstGeom prst="rect">
             <a:avLst/>
@@ -5040,7 +4792,7 @@
                 <a:spcPts val="0"/>
               </a:spcBef>
               <a:spcAft>
-                <a:spcPts val="0"/>
+                <a:spcPts val="1800"/>
               </a:spcAft>
               <a:defRPr/>
             </a:pPr>
@@ -5049,7 +4801,7 @@
                 <a:solidFill>
                   <a:prstClr val="black"/>
                 </a:solidFill>
-                <a:latin typeface="Calibri"/>
+                <a:latin typeface="+mn-lt"/>
                 <a:cs typeface="Arial" pitchFamily="34" charset="0"/>
               </a:rPr>
               <a:t>The data for this project was extracted from publicly available databases. For US data, numbers for daily total infections, deaths, and vaccinations was acquired from the CDC [1]. For Italian data, numbers for current infections, recoveries, and death were acquired from the Italian Department of Civil Protection [2].</a:t>
@@ -5061,17 +4813,20 @@
                 <a:spcPts val="0"/>
               </a:spcBef>
               <a:spcAft>
-                <a:spcPts val="0"/>
+                <a:spcPts val="1800"/>
               </a:spcAft>
               <a:defRPr/>
             </a:pPr>
-            <a:endParaRPr lang="en-US" sz="3200" dirty="0">
-              <a:solidFill>
-                <a:prstClr val="black"/>
-              </a:solidFill>
-              <a:latin typeface="Calibri"/>
-              <a:cs typeface="Arial" pitchFamily="34" charset="0"/>
-            </a:endParaRPr>
+            <a:r>
+              <a:rPr lang="en-US" sz="3200" dirty="0">
+                <a:solidFill>
+                  <a:prstClr val="black"/>
+                </a:solidFill>
+                <a:latin typeface="+mn-lt"/>
+                <a:cs typeface="Arial" pitchFamily="34" charset="0"/>
+              </a:rPr>
+              <a:t>For some data sets the recovered population is not reported or unreliable. To approximate the recovered population, we assume infected individuals recover after 14 days.</a:t>
+            </a:r>
           </a:p>
           <a:p>
             <a:pPr lvl="0" defTabSz="3574551">
@@ -5079,7 +4834,7 @@
                 <a:spcPts val="0"/>
               </a:spcBef>
               <a:spcAft>
-                <a:spcPts val="0"/>
+                <a:spcPts val="1800"/>
               </a:spcAft>
               <a:defRPr/>
             </a:pPr>
@@ -5088,69 +4843,10 @@
                 <a:solidFill>
                   <a:prstClr val="black"/>
                 </a:solidFill>
-                <a:latin typeface="Calibri"/>
+                <a:latin typeface="+mn-lt"/>
                 <a:cs typeface="Arial" pitchFamily="34" charset="0"/>
               </a:rPr>
-              <a:t>Additionally for some data sets the recovered population is not reported or unreliable. To approximate the recovered population, we assume infected individuals recover after 14 days.</a:t>
-            </a:r>
-          </a:p>
-          <a:p>
-            <a:pPr lvl="0" defTabSz="3574551">
-              <a:spcBef>
-                <a:spcPts val="0"/>
-              </a:spcBef>
-              <a:spcAft>
-                <a:spcPts val="0"/>
-              </a:spcAft>
-              <a:defRPr/>
-            </a:pPr>
-            <a:endParaRPr lang="en-US" sz="3200" dirty="0">
-              <a:solidFill>
-                <a:prstClr val="black"/>
-              </a:solidFill>
-              <a:latin typeface="Calibri"/>
-              <a:cs typeface="Arial" pitchFamily="34" charset="0"/>
-            </a:endParaRPr>
-          </a:p>
-          <a:p>
-            <a:pPr lvl="0" defTabSz="3574551">
-              <a:spcBef>
-                <a:spcPts val="0"/>
-              </a:spcBef>
-              <a:spcAft>
-                <a:spcPts val="0"/>
-              </a:spcAft>
-              <a:defRPr/>
-            </a:pPr>
-            <a:r>
-              <a:rPr lang="en-US" sz="3200" dirty="0">
-                <a:solidFill>
-                  <a:prstClr val="black"/>
-                </a:solidFill>
-                <a:latin typeface="Calibri"/>
-                <a:cs typeface="Arial" pitchFamily="34" charset="0"/>
-              </a:rPr>
-              <a:t>Lastly, the susceptible population must be approximated. This is done by scaling the infected, recovered, and dead populations. This scaling factor, </a:t>
-            </a:r>
-            <a:r>
-              <a:rPr lang="en-US" sz="3200" i="1" dirty="0">
-                <a:solidFill>
-                  <a:prstClr val="black"/>
-                </a:solidFill>
-                <a:latin typeface="Calibri"/>
-                <a:cs typeface="Arial" pitchFamily="34" charset="0"/>
-              </a:rPr>
-              <a:t>q</a:t>
-            </a:r>
-            <a:r>
-              <a:rPr lang="en-US" sz="3200" dirty="0">
-                <a:solidFill>
-                  <a:prstClr val="black"/>
-                </a:solidFill>
-                <a:latin typeface="Calibri"/>
-                <a:cs typeface="Arial" pitchFamily="34" charset="0"/>
-              </a:rPr>
-              <a:t>, is solved using gridding and minimizing an objective function.</a:t>
+              <a:t>The susceptible population must be approximated. This is done by scaling the infected, recovered, and dead populations. This scaling factor, q, is solved using gridding and minimizing an objective function.</a:t>
             </a:r>
           </a:p>
         </p:txBody>
@@ -5163,8 +4859,8 @@
         </p:nvSpPr>
         <p:spPr>
           <a:xfrm>
-            <a:off x="29858105" y="21582757"/>
-            <a:ext cx="13627351" cy="4524315"/>
+            <a:off x="29858105" y="21349941"/>
+            <a:ext cx="13627351" cy="6494085"/>
           </a:xfrm>
           <a:prstGeom prst="rect">
             <a:avLst/>
@@ -5193,7 +4889,7 @@
                 <a:latin typeface="Calibri"/>
                 <a:cs typeface="Arial" pitchFamily="34" charset="0"/>
               </a:rPr>
-              <a:t>We have demonstrated that the SIRD feedback model has significant advantages of the SIRD model.</a:t>
+              <a:t>We have demonstrated the SIRD feedback model has significant advantages of the SIRD model.</a:t>
             </a:r>
           </a:p>
           <a:p>
@@ -5206,16 +4902,19 @@
               </a:spcAft>
               <a:defRPr/>
             </a:pPr>
-            <a:endParaRPr lang="en-US" sz="3200" dirty="0">
-              <a:solidFill>
-                <a:prstClr val="black"/>
-              </a:solidFill>
-              <a:latin typeface="Calibri"/>
-              <a:cs typeface="Arial" pitchFamily="34" charset="0"/>
-            </a:endParaRPr>
-          </a:p>
-          <a:p>
-            <a:pPr marL="457200" indent="-457200" defTabSz="3574551">
+            <a:r>
+              <a:rPr lang="en-US" sz="3200" dirty="0">
+                <a:solidFill>
+                  <a:prstClr val="black"/>
+                </a:solidFill>
+                <a:latin typeface="Calibri"/>
+                <a:cs typeface="Arial" pitchFamily="34" charset="0"/>
+              </a:rPr>
+              <a:t>Better explains the model dynamics. </a:t>
+            </a:r>
+          </a:p>
+          <a:p>
+            <a:pPr marL="914400" indent="-457200" defTabSz="3574551">
               <a:spcBef>
                 <a:spcPts val="0"/>
               </a:spcBef>
@@ -5234,11 +4933,31 @@
                 <a:latin typeface="Calibri"/>
                 <a:cs typeface="Arial" pitchFamily="34" charset="0"/>
               </a:rPr>
-              <a:t>The feedback model is capable of predicting waves of infection, while the SIRD only predicts either a disease decay or an unconstrained outbreak spike.</a:t>
-            </a:r>
-          </a:p>
-          <a:p>
-            <a:pPr marL="457200" indent="-457200" defTabSz="3574551">
+              <a:t>The feedback model has adaptive transmission rate </a:t>
+            </a:r>
+            <a:r>
+              <a:rPr lang="en-US" sz="3200" b="1" i="1" dirty="0">
+                <a:solidFill>
+                  <a:prstClr val="black"/>
+                </a:solidFill>
+                <a:latin typeface="Symbol" panose="05050102010706020507" pitchFamily="18" charset="2"/>
+                <a:cs typeface="Arial" pitchFamily="34" charset="0"/>
+              </a:rPr>
+              <a:t>b</a:t>
+            </a:r>
+            <a:r>
+              <a:rPr lang="en-US" sz="3200" dirty="0">
+                <a:solidFill>
+                  <a:prstClr val="black"/>
+                </a:solidFill>
+                <a:latin typeface="Calibri"/>
+                <a:cs typeface="Arial" pitchFamily="34" charset="0"/>
+              </a:rPr>
+              <a:t>  which can better model the public and government reaction to the disease.</a:t>
+            </a:r>
+          </a:p>
+          <a:p>
+            <a:pPr marL="914400" indent="-457200" defTabSz="3574551">
               <a:spcBef>
                 <a:spcPts val="0"/>
               </a:spcBef>
@@ -5257,11 +4976,32 @@
                 <a:latin typeface="Calibri"/>
                 <a:cs typeface="Arial" pitchFamily="34" charset="0"/>
               </a:rPr>
-              <a:t>The feedback model has a time varying beta which can track how the public and government react to the disease.</a:t>
-            </a:r>
-          </a:p>
-          <a:p>
-            <a:pPr marL="457200" indent="-457200" defTabSz="3574551">
+              <a:t>The feedback model is capable of modeling waves of infection, while the SIRD only predicts either a disease decay or an unconstrained outbreak spike.</a:t>
+            </a:r>
+          </a:p>
+          <a:p>
+            <a:pPr defTabSz="3574551">
+              <a:spcBef>
+                <a:spcPts val="0"/>
+              </a:spcBef>
+              <a:spcAft>
+                <a:spcPts val="0"/>
+              </a:spcAft>
+              <a:defRPr/>
+            </a:pPr>
+            <a:r>
+              <a:rPr lang="en-US" sz="3200" dirty="0">
+                <a:solidFill>
+                  <a:prstClr val="black"/>
+                </a:solidFill>
+                <a:latin typeface="Calibri"/>
+                <a:cs typeface="Arial" pitchFamily="34" charset="0"/>
+              </a:rPr>
+              <a:t>Better predicts disease spread</a:t>
+            </a:r>
+          </a:p>
+          <a:p>
+            <a:pPr marL="914400" indent="-457200" defTabSz="3574551">
               <a:spcBef>
                 <a:spcPts val="0"/>
               </a:spcBef>
@@ -5280,7 +5020,27 @@
                 <a:latin typeface="Calibri"/>
                 <a:cs typeface="Arial" pitchFamily="34" charset="0"/>
               </a:rPr>
-              <a:t>At worst, if the feedback model optimizes poorly, it has the same predictive power as the standard SIRD model.</a:t>
+              <a:t>The standard SIRD model is only capable of predicting exponential type growth and decay (constant </a:t>
+            </a:r>
+            <a:r>
+              <a:rPr lang="en-US" sz="3200" b="1" i="1" dirty="0">
+                <a:solidFill>
+                  <a:prstClr val="black"/>
+                </a:solidFill>
+                <a:latin typeface="Symbol" panose="05050102010706020507" pitchFamily="18" charset="2"/>
+                <a:cs typeface="Arial" pitchFamily="34" charset="0"/>
+              </a:rPr>
+              <a:t>b</a:t>
+            </a:r>
+            <a:r>
+              <a:rPr lang="en-US" sz="3200" dirty="0">
+                <a:solidFill>
+                  <a:prstClr val="black"/>
+                </a:solidFill>
+                <a:latin typeface="Calibri"/>
+                <a:cs typeface="Arial" pitchFamily="34" charset="0"/>
+              </a:rPr>
+              <a:t>).  While the feedback model is more robust and more reliable in predicting the progression of infections in a wider range of conditions.</a:t>
             </a:r>
             <a:endParaRPr lang="en-US" sz="3600" dirty="0">
               <a:solidFill>
@@ -5459,8 +5219,8 @@
           </a:p>
         </p:txBody>
       </p:sp>
-      <mc:AlternateContent xmlns:mc="http://schemas.openxmlformats.org/markup-compatibility/2006">
-        <mc:Choice xmlns:a14="http://schemas.microsoft.com/office/drawing/2010/main" Requires="a14">
+      <mc:AlternateContent xmlns:mc="http://schemas.openxmlformats.org/markup-compatibility/2006" xmlns:a14="http://schemas.microsoft.com/office/drawing/2010/main">
+        <mc:Choice Requires="a14">
           <p:sp>
             <p:nvSpPr>
               <p:cNvPr id="94" name="TextBox 93">
@@ -5475,7 +5235,7 @@
             </p:nvSpPr>
             <p:spPr>
               <a:xfrm>
-                <a:off x="884940" y="19828630"/>
+                <a:off x="2611281" y="19507200"/>
                 <a:ext cx="9398874" cy="553998"/>
               </a:xfrm>
               <a:prstGeom prst="rect">
@@ -5634,7 +5394,7 @@
             </p:txBody>
           </p:sp>
         </mc:Choice>
-        <mc:Fallback>
+        <mc:Fallback xmlns="">
           <p:sp>
             <p:nvSpPr>
               <p:cNvPr id="94" name="TextBox 93">
@@ -5651,14 +5411,14 @@
             </p:nvSpPr>
             <p:spPr>
               <a:xfrm>
-                <a:off x="884940" y="19828630"/>
+                <a:off x="2611281" y="19507200"/>
                 <a:ext cx="9398874" cy="553998"/>
               </a:xfrm>
               <a:prstGeom prst="rect">
                 <a:avLst/>
               </a:prstGeom>
               <a:blipFill>
-                <a:blip r:embed="rId10"/>
+                <a:blip r:embed="rId9"/>
                 <a:stretch>
                   <a:fillRect/>
                 </a:stretch>
@@ -5695,8 +5455,8 @@
         </p:nvSpPr>
         <p:spPr bwMode="auto">
           <a:xfrm>
-            <a:off x="219452" y="27817458"/>
-            <a:ext cx="5110513" cy="772092"/>
+            <a:off x="399945" y="27771567"/>
+            <a:ext cx="8570103" cy="772092"/>
           </a:xfrm>
           <a:prstGeom prst="rect">
             <a:avLst/>
@@ -5727,7 +5487,7 @@
                 </a:solidFill>
                 <a:latin typeface="Calibri" pitchFamily="34" charset="0"/>
               </a:rPr>
-              <a:t>Feedback Model</a:t>
+              <a:t>Incorporating Feedback</a:t>
             </a:r>
           </a:p>
         </p:txBody>
@@ -5746,14 +5506,14 @@
         </p:nvGrpSpPr>
         <p:grpSpPr>
           <a:xfrm>
-            <a:off x="10034336" y="21907862"/>
-            <a:ext cx="4831982" cy="4040006"/>
+            <a:off x="9829800" y="21992740"/>
+            <a:ext cx="4831982" cy="3839060"/>
             <a:chOff x="10022392" y="22459903"/>
             <a:chExt cx="4831982" cy="4040006"/>
           </a:xfrm>
         </p:grpSpPr>
-        <mc:AlternateContent xmlns:mc="http://schemas.openxmlformats.org/markup-compatibility/2006">
-          <mc:Choice xmlns:a14="http://schemas.microsoft.com/office/drawing/2010/main" Requires="a14">
+        <mc:AlternateContent xmlns:mc="http://schemas.openxmlformats.org/markup-compatibility/2006" xmlns:a14="http://schemas.microsoft.com/office/drawing/2010/main">
+          <mc:Choice Requires="a14">
             <p:sp>
               <p:nvSpPr>
                 <p:cNvPr id="7" name="TextBox 6"/>
@@ -5851,7 +5611,7 @@
               </p:txBody>
             </p:sp>
           </mc:Choice>
-          <mc:Fallback>
+          <mc:Fallback xmlns="">
             <p:sp>
               <p:nvSpPr>
                 <p:cNvPr id="7" name="TextBox 6"/>
@@ -5890,8 +5650,8 @@
             </p:sp>
           </mc:Fallback>
         </mc:AlternateContent>
-        <mc:AlternateContent xmlns:mc="http://schemas.openxmlformats.org/markup-compatibility/2006">
-          <mc:Choice xmlns:a14="http://schemas.microsoft.com/office/drawing/2010/main" Requires="a14">
+        <mc:AlternateContent xmlns:mc="http://schemas.openxmlformats.org/markup-compatibility/2006" xmlns:a14="http://schemas.microsoft.com/office/drawing/2010/main">
+          <mc:Choice Requires="a14">
             <p:sp>
               <p:nvSpPr>
                 <p:cNvPr id="55" name="TextBox 54"/>
@@ -6026,7 +5786,7 @@
               </p:txBody>
             </p:sp>
           </mc:Choice>
-          <mc:Fallback>
+          <mc:Fallback xmlns="">
             <p:sp>
               <p:nvSpPr>
                 <p:cNvPr id="55" name="TextBox 54"/>
@@ -6065,8 +5825,8 @@
             </p:sp>
           </mc:Fallback>
         </mc:AlternateContent>
-        <mc:AlternateContent xmlns:mc="http://schemas.openxmlformats.org/markup-compatibility/2006">
-          <mc:Choice xmlns:a14="http://schemas.microsoft.com/office/drawing/2010/main" Requires="a14">
+        <mc:AlternateContent xmlns:mc="http://schemas.openxmlformats.org/markup-compatibility/2006" xmlns:a14="http://schemas.microsoft.com/office/drawing/2010/main">
+          <mc:Choice Requires="a14">
             <p:sp>
               <p:nvSpPr>
                 <p:cNvPr id="56" name="TextBox 55"/>
@@ -6164,7 +5924,7 @@
               </p:txBody>
             </p:sp>
           </mc:Choice>
-          <mc:Fallback>
+          <mc:Fallback xmlns="">
             <p:sp>
               <p:nvSpPr>
                 <p:cNvPr id="56" name="TextBox 55"/>
@@ -6203,8 +5963,8 @@
             </p:sp>
           </mc:Fallback>
         </mc:AlternateContent>
-        <mc:AlternateContent xmlns:mc="http://schemas.openxmlformats.org/markup-compatibility/2006">
-          <mc:Choice xmlns:a14="http://schemas.microsoft.com/office/drawing/2010/main" Requires="a14">
+        <mc:AlternateContent xmlns:mc="http://schemas.openxmlformats.org/markup-compatibility/2006" xmlns:a14="http://schemas.microsoft.com/office/drawing/2010/main">
+          <mc:Choice Requires="a14">
             <p:sp>
               <p:nvSpPr>
                 <p:cNvPr id="96" name="TextBox 95">
@@ -6375,7 +6135,7 @@
               </p:txBody>
             </p:sp>
           </mc:Choice>
-          <mc:Fallback>
+          <mc:Fallback xmlns="">
             <p:sp>
               <p:nvSpPr>
                 <p:cNvPr id="96" name="TextBox 95">
@@ -8142,7 +7902,7 @@
         </p:nvGrpSpPr>
         <p:grpSpPr>
           <a:xfrm>
-            <a:off x="9794996" y="20384247"/>
+            <a:off x="9501285" y="20384247"/>
             <a:ext cx="4214715" cy="1875106"/>
             <a:chOff x="1399592" y="830425"/>
             <a:chExt cx="2889380" cy="1285471"/>
@@ -9538,8 +9298,8 @@
           </p:txBody>
         </p:sp>
       </p:grpSp>
-      <mc:AlternateContent xmlns:mc="http://schemas.openxmlformats.org/markup-compatibility/2006">
-        <mc:Choice xmlns:a14="http://schemas.microsoft.com/office/drawing/2010/main" Requires="a14">
+      <mc:AlternateContent xmlns:mc="http://schemas.openxmlformats.org/markup-compatibility/2006" xmlns:a14="http://schemas.microsoft.com/office/drawing/2010/main">
+        <mc:Choice Requires="a14">
           <p:sp>
             <p:nvSpPr>
               <p:cNvPr id="144" name="TextBox 143">
@@ -9554,7 +9314,7 @@
             </p:nvSpPr>
             <p:spPr>
               <a:xfrm>
-                <a:off x="1508325" y="30831140"/>
+                <a:off x="3743751" y="31114985"/>
                 <a:ext cx="6687926" cy="1162626"/>
               </a:xfrm>
               <a:prstGeom prst="rect">
@@ -9906,7 +9666,7 @@
                                             </a:solidFill>
                                             <a:latin typeface="Cambria Math" panose="02040503050406030204" pitchFamily="18" charset="0"/>
                                           </a:rPr>
-                                          <m:t>𝑑</m:t>
+                                          <m:t>𝛿</m:t>
                                         </m:r>
                                         <m:r>
                                           <a:rPr lang="en-US" sz="3600" b="0" i="1" smtClean="0">
@@ -9984,7 +9744,7 @@
             </p:txBody>
           </p:sp>
         </mc:Choice>
-        <mc:Fallback>
+        <mc:Fallback xmlns="">
           <p:sp>
             <p:nvSpPr>
               <p:cNvPr id="144" name="TextBox 143">
@@ -10001,7 +9761,7 @@
             </p:nvSpPr>
             <p:spPr>
               <a:xfrm>
-                <a:off x="1508325" y="30831140"/>
+                <a:off x="3743751" y="31114985"/>
                 <a:ext cx="6687926" cy="1162626"/>
               </a:xfrm>
               <a:prstGeom prst="rect">
@@ -10249,7 +10009,7 @@
               <a:rPr lang="en-US" sz="3200" dirty="0">
                 <a:cs typeface="Arial" pitchFamily="34" charset="0"/>
               </a:rPr>
-              <a:t>– population proportion  that is susceptible</a:t>
+              <a:t>– population proportion that is susceptible</a:t>
             </a:r>
           </a:p>
           <a:p>
@@ -10354,7 +10114,7 @@
               <a:rPr lang="en-US" sz="3200" dirty="0">
                 <a:cs typeface="Arial" pitchFamily="34" charset="0"/>
               </a:rPr>
-              <a:t>– population proportion  that has died</a:t>
+              <a:t>– population proportion that has died</a:t>
             </a:r>
           </a:p>
           <a:p>
@@ -10443,8 +10203,8 @@
         </p:nvSpPr>
         <p:spPr bwMode="auto">
           <a:xfrm>
-            <a:off x="14408913" y="14780951"/>
-            <a:ext cx="10727651" cy="772092"/>
+            <a:off x="14971468" y="16750430"/>
+            <a:ext cx="10165096" cy="772092"/>
           </a:xfrm>
           <a:prstGeom prst="rect">
             <a:avLst/>
@@ -10496,8 +10256,8 @@
         </p:nvSpPr>
         <p:spPr bwMode="auto">
           <a:xfrm>
-            <a:off x="29605180" y="4600641"/>
-            <a:ext cx="10727651" cy="772092"/>
+            <a:off x="29858104" y="4675184"/>
+            <a:ext cx="10774511" cy="772092"/>
           </a:xfrm>
           <a:prstGeom prst="rect">
             <a:avLst/>
@@ -10560,8 +10320,8 @@
         </p:blipFill>
         <p:spPr>
           <a:xfrm>
-            <a:off x="14376119" y="10549354"/>
-            <a:ext cx="7569482" cy="4093692"/>
+            <a:off x="14522844" y="10549354"/>
+            <a:ext cx="7270356" cy="3931920"/>
           </a:xfrm>
           <a:prstGeom prst="rect">
             <a:avLst/>
@@ -10596,8 +10356,8 @@
         </p:blipFill>
         <p:spPr>
           <a:xfrm>
-            <a:off x="21677003" y="6554882"/>
-            <a:ext cx="8262695" cy="4093692"/>
+            <a:off x="21412200" y="6554882"/>
+            <a:ext cx="7936175" cy="3931920"/>
           </a:xfrm>
           <a:prstGeom prst="rect">
             <a:avLst/>
@@ -10631,1102 +10391,14 @@
         </p:blipFill>
         <p:spPr>
           <a:xfrm>
-            <a:off x="14376119" y="6488990"/>
-            <a:ext cx="7569482" cy="4093692"/>
+            <a:off x="14522844" y="6488990"/>
+            <a:ext cx="7270356" cy="3931920"/>
           </a:xfrm>
           <a:prstGeom prst="rect">
             <a:avLst/>
           </a:prstGeom>
         </p:spPr>
       </p:pic>
-      <p:grpSp>
-        <p:nvGrpSpPr>
-          <p:cNvPr id="175" name="Group 174">
-            <a:extLst>
-              <a:ext uri="{FF2B5EF4-FFF2-40B4-BE49-F238E27FC236}">
-                <a16:creationId xmlns:a16="http://schemas.microsoft.com/office/drawing/2014/main" id="{67082DAC-D268-4D76-9C40-49FDAFC881E0}"/>
-              </a:ext>
-            </a:extLst>
-          </p:cNvPr>
-          <p:cNvGrpSpPr/>
-          <p:nvPr/>
-        </p:nvGrpSpPr>
-        <p:grpSpPr>
-          <a:xfrm>
-            <a:off x="31960595" y="5372733"/>
-            <a:ext cx="8224570" cy="3533125"/>
-            <a:chOff x="3217196" y="1828800"/>
-            <a:chExt cx="5532361" cy="2275367"/>
-          </a:xfrm>
-        </p:grpSpPr>
-        <p:sp>
-          <p:nvSpPr>
-            <p:cNvPr id="176" name="Rounded Rectangle 5">
-              <a:extLst>
-                <a:ext uri="{FF2B5EF4-FFF2-40B4-BE49-F238E27FC236}">
-                  <a16:creationId xmlns:a16="http://schemas.microsoft.com/office/drawing/2014/main" id="{CD904160-A1A4-42C9-83F6-1F57B371C8E3}"/>
-                </a:ext>
-              </a:extLst>
-            </p:cNvPr>
-            <p:cNvSpPr/>
-            <p:nvPr/>
-          </p:nvSpPr>
-          <p:spPr>
-            <a:xfrm>
-              <a:off x="4499260" y="1828800"/>
-              <a:ext cx="2874036" cy="2275367"/>
-            </a:xfrm>
-            <a:prstGeom prst="roundRect">
-              <a:avLst/>
-            </a:prstGeom>
-            <a:solidFill>
-              <a:schemeClr val="bg1">
-                <a:lumMod val="85000"/>
-              </a:schemeClr>
-            </a:solidFill>
-          </p:spPr>
-          <p:style>
-            <a:lnRef idx="2">
-              <a:schemeClr val="accent1">
-                <a:shade val="50000"/>
-              </a:schemeClr>
-            </a:lnRef>
-            <a:fillRef idx="1">
-              <a:schemeClr val="accent1"/>
-            </a:fillRef>
-            <a:effectRef idx="0">
-              <a:schemeClr val="accent1"/>
-            </a:effectRef>
-            <a:fontRef idx="minor">
-              <a:schemeClr val="lt1"/>
-            </a:fontRef>
-          </p:style>
-          <p:txBody>
-            <a:bodyPr rtlCol="0" anchor="ctr"/>
-            <a:lstStyle/>
-            <a:p>
-              <a:pPr algn="ctr"/>
-              <a:endParaRPr lang="en-US"/>
-            </a:p>
-          </p:txBody>
-        </p:sp>
-        <p:sp>
-          <p:nvSpPr>
-            <p:cNvPr id="178" name="Right Arrow 7">
-              <a:extLst>
-                <a:ext uri="{FF2B5EF4-FFF2-40B4-BE49-F238E27FC236}">
-                  <a16:creationId xmlns:a16="http://schemas.microsoft.com/office/drawing/2014/main" id="{BCAE91B1-30BE-4107-8E41-5A4B583807CD}"/>
-                </a:ext>
-              </a:extLst>
-            </p:cNvPr>
-            <p:cNvSpPr/>
-            <p:nvPr/>
-          </p:nvSpPr>
-          <p:spPr>
-            <a:xfrm>
-              <a:off x="3997846" y="2679405"/>
-              <a:ext cx="354923" cy="597909"/>
-            </a:xfrm>
-            <a:prstGeom prst="rightArrow">
-              <a:avLst/>
-            </a:prstGeom>
-          </p:spPr>
-          <p:style>
-            <a:lnRef idx="2">
-              <a:schemeClr val="accent1">
-                <a:shade val="50000"/>
-              </a:schemeClr>
-            </a:lnRef>
-            <a:fillRef idx="1">
-              <a:schemeClr val="accent1"/>
-            </a:fillRef>
-            <a:effectRef idx="0">
-              <a:schemeClr val="accent1"/>
-            </a:effectRef>
-            <a:fontRef idx="minor">
-              <a:schemeClr val="lt1"/>
-            </a:fontRef>
-          </p:style>
-          <p:txBody>
-            <a:bodyPr rtlCol="0" anchor="ctr"/>
-            <a:lstStyle/>
-            <a:p>
-              <a:pPr algn="ctr"/>
-              <a:endParaRPr lang="en-US"/>
-            </a:p>
-          </p:txBody>
-        </p:sp>
-        <p:sp>
-          <p:nvSpPr>
-            <p:cNvPr id="179" name="Oval 178">
-              <a:extLst>
-                <a:ext uri="{FF2B5EF4-FFF2-40B4-BE49-F238E27FC236}">
-                  <a16:creationId xmlns:a16="http://schemas.microsoft.com/office/drawing/2014/main" id="{62B9B8C5-CE3A-40BF-B83A-6BFE2D417148}"/>
-                </a:ext>
-              </a:extLst>
-            </p:cNvPr>
-            <p:cNvSpPr/>
-            <p:nvPr/>
-          </p:nvSpPr>
-          <p:spPr>
-            <a:xfrm>
-              <a:off x="3217196" y="2730489"/>
-              <a:ext cx="513184" cy="447869"/>
-            </a:xfrm>
-            <a:prstGeom prst="ellipse">
-              <a:avLst/>
-            </a:prstGeom>
-          </p:spPr>
-          <p:style>
-            <a:lnRef idx="2">
-              <a:schemeClr val="accent1">
-                <a:shade val="50000"/>
-              </a:schemeClr>
-            </a:lnRef>
-            <a:fillRef idx="1">
-              <a:schemeClr val="accent1"/>
-            </a:fillRef>
-            <a:effectRef idx="0">
-              <a:schemeClr val="accent1"/>
-            </a:effectRef>
-            <a:fontRef idx="minor">
-              <a:schemeClr val="lt1"/>
-            </a:fontRef>
-          </p:style>
-          <p:txBody>
-            <a:bodyPr rtlCol="0" anchor="ctr"/>
-            <a:lstStyle/>
-            <a:p>
-              <a:pPr algn="ctr"/>
-              <a:r>
-                <a:rPr lang="en-US" sz="3600" dirty="0">
-                  <a:solidFill>
-                    <a:schemeClr val="tx1"/>
-                  </a:solidFill>
-                </a:rPr>
-                <a:t>V</a:t>
-              </a:r>
-            </a:p>
-          </p:txBody>
-        </p:sp>
-        <p:sp>
-          <p:nvSpPr>
-            <p:cNvPr id="180" name="Oval 179">
-              <a:extLst>
-                <a:ext uri="{FF2B5EF4-FFF2-40B4-BE49-F238E27FC236}">
-                  <a16:creationId xmlns:a16="http://schemas.microsoft.com/office/drawing/2014/main" id="{34B35EC1-433E-4800-AE72-2580C418CCCE}"/>
-                </a:ext>
-              </a:extLst>
-            </p:cNvPr>
-            <p:cNvSpPr/>
-            <p:nvPr/>
-          </p:nvSpPr>
-          <p:spPr>
-            <a:xfrm>
-              <a:off x="8236373" y="2713760"/>
-              <a:ext cx="513184" cy="481325"/>
-            </a:xfrm>
-            <a:prstGeom prst="ellipse">
-              <a:avLst/>
-            </a:prstGeom>
-          </p:spPr>
-          <p:style>
-            <a:lnRef idx="2">
-              <a:schemeClr val="accent1">
-                <a:shade val="50000"/>
-              </a:schemeClr>
-            </a:lnRef>
-            <a:fillRef idx="1">
-              <a:schemeClr val="accent1"/>
-            </a:fillRef>
-            <a:effectRef idx="0">
-              <a:schemeClr val="accent1"/>
-            </a:effectRef>
-            <a:fontRef idx="minor">
-              <a:schemeClr val="lt1"/>
-            </a:fontRef>
-          </p:style>
-          <p:txBody>
-            <a:bodyPr rtlCol="0" anchor="ctr"/>
-            <a:lstStyle/>
-            <a:p>
-              <a:pPr algn="ctr"/>
-              <a:r>
-                <a:rPr lang="en-US" sz="3600" dirty="0">
-                  <a:solidFill>
-                    <a:schemeClr val="tx1"/>
-                  </a:solidFill>
-                </a:rPr>
-                <a:t>I</a:t>
-              </a:r>
-            </a:p>
-          </p:txBody>
-        </p:sp>
-        <p:grpSp>
-          <p:nvGrpSpPr>
-            <p:cNvPr id="181" name="Group 180">
-              <a:extLst>
-                <a:ext uri="{FF2B5EF4-FFF2-40B4-BE49-F238E27FC236}">
-                  <a16:creationId xmlns:a16="http://schemas.microsoft.com/office/drawing/2014/main" id="{6A101AC9-2A10-47C1-8C25-8B97F96746B5}"/>
-                </a:ext>
-              </a:extLst>
-            </p:cNvPr>
-            <p:cNvGrpSpPr/>
-            <p:nvPr/>
-          </p:nvGrpSpPr>
-          <p:grpSpPr>
-            <a:xfrm>
-              <a:off x="4693982" y="1958109"/>
-              <a:ext cx="3191987" cy="2001492"/>
-              <a:chOff x="1005256" y="15678897"/>
-              <a:chExt cx="4838050" cy="3508907"/>
-            </a:xfrm>
-          </p:grpSpPr>
-          <mc:AlternateContent xmlns:mc="http://schemas.openxmlformats.org/markup-compatibility/2006">
-            <mc:Choice xmlns:a14="http://schemas.microsoft.com/office/drawing/2010/main" Requires="a14">
-              <p:sp>
-                <p:nvSpPr>
-                  <p:cNvPr id="184" name="TextBox 183">
-                    <a:extLst>
-                      <a:ext uri="{FF2B5EF4-FFF2-40B4-BE49-F238E27FC236}">
-                        <a16:creationId xmlns:a16="http://schemas.microsoft.com/office/drawing/2014/main" id="{64F74ACB-E5FE-4EC4-81A1-6EF924792416}"/>
-                      </a:ext>
-                    </a:extLst>
-                  </p:cNvPr>
-                  <p:cNvSpPr txBox="1"/>
-                  <p:nvPr/>
-                </p:nvSpPr>
-                <p:spPr>
-                  <a:xfrm>
-                    <a:off x="1005256" y="18701314"/>
-                    <a:ext cx="4800600" cy="486490"/>
-                  </a:xfrm>
-                  <a:prstGeom prst="rect">
-                    <a:avLst/>
-                  </a:prstGeom>
-                  <a:noFill/>
-                </p:spPr>
-                <p:txBody>
-                  <a:bodyPr wrap="square" lIns="0" tIns="0" rIns="0" bIns="0" rtlCol="0">
-                    <a:spAutoFit/>
-                  </a:bodyPr>
-                  <a:lstStyle/>
-                  <a:p>
-                    <a:pPr/>
-                    <a14:m>
-                      <m:oMathPara xmlns:m="http://schemas.openxmlformats.org/officeDocument/2006/math">
-                        <m:oMathParaPr>
-                          <m:jc m:val="left"/>
-                        </m:oMathParaPr>
-                        <m:oMath xmlns:m="http://schemas.openxmlformats.org/officeDocument/2006/math">
-                          <m:m>
-                            <m:mPr>
-                              <m:mcs>
-                                <m:mc>
-                                  <m:mcPr>
-                                    <m:count m:val="1"/>
-                                    <m:mcJc m:val="center"/>
-                                  </m:mcPr>
-                                </m:mc>
-                              </m:mcs>
-                              <m:ctrlPr>
-                                <a:rPr lang="en-US" sz="2800" b="0" i="1" smtClean="0">
-                                  <a:latin typeface="Cambria Math" panose="02040503050406030204" pitchFamily="18" charset="0"/>
-                                </a:rPr>
-                              </m:ctrlPr>
-                            </m:mPr>
-                            <m:mr>
-                              <m:e>
-                                <m:acc>
-                                  <m:accPr>
-                                    <m:chr m:val="̇"/>
-                                    <m:ctrlPr>
-                                      <a:rPr lang="en-US" sz="2800" b="0" i="1" smtClean="0">
-                                        <a:latin typeface="Cambria Math" panose="02040503050406030204" pitchFamily="18" charset="0"/>
-                                      </a:rPr>
-                                    </m:ctrlPr>
-                                  </m:accPr>
-                                  <m:e>
-                                    <m:r>
-                                      <a:rPr lang="en-US" sz="2800" b="0" i="1" smtClean="0">
-                                        <a:latin typeface="Cambria Math" panose="02040503050406030204" pitchFamily="18" charset="0"/>
-                                      </a:rPr>
-                                      <m:t>𝐷</m:t>
-                                    </m:r>
-                                  </m:e>
-                                </m:acc>
-                                <m:r>
-                                  <m:rPr>
-                                    <m:brk m:alnAt="7"/>
-                                  </m:rPr>
-                                  <a:rPr lang="en-US" sz="2800" b="0" i="1" smtClean="0">
-                                    <a:latin typeface="Cambria Math" panose="02040503050406030204" pitchFamily="18" charset="0"/>
-                                  </a:rPr>
-                                  <m:t>=</m:t>
-                                </m:r>
-                                <m:r>
-                                  <a:rPr lang="en-US" sz="2800" b="0" i="1" smtClean="0">
-                                    <a:latin typeface="Cambria Math" panose="02040503050406030204" pitchFamily="18" charset="0"/>
-                                  </a:rPr>
-                                  <m:t>𝜈</m:t>
-                                </m:r>
-                                <m:r>
-                                  <a:rPr lang="en-US" sz="2800" i="1">
-                                    <a:latin typeface="Cambria Math" panose="02040503050406030204" pitchFamily="18" charset="0"/>
-                                  </a:rPr>
-                                  <m:t>𝐼</m:t>
-                                </m:r>
-                              </m:e>
-                            </m:mr>
-                          </m:m>
-                        </m:oMath>
-                      </m:oMathPara>
-                    </a14:m>
-                    <a:endParaRPr lang="en-US" sz="2800" dirty="0"/>
-                  </a:p>
-                </p:txBody>
-              </p:sp>
-            </mc:Choice>
-            <mc:Fallback>
-              <p:sp>
-                <p:nvSpPr>
-                  <p:cNvPr id="184" name="TextBox 183">
-                    <a:extLst>
-                      <a:ext uri="{FF2B5EF4-FFF2-40B4-BE49-F238E27FC236}">
-                        <a16:creationId xmlns:a16="http://schemas.microsoft.com/office/drawing/2014/main" id="{64F74ACB-E5FE-4EC4-81A1-6EF924792416}"/>
-                      </a:ext>
-                    </a:extLst>
-                  </p:cNvPr>
-                  <p:cNvSpPr txBox="1">
-                    <a:spLocks noRot="1" noChangeAspect="1" noMove="1" noResize="1" noEditPoints="1" noAdjustHandles="1" noChangeArrowheads="1" noChangeShapeType="1" noTextEdit="1"/>
-                  </p:cNvSpPr>
-                  <p:nvPr/>
-                </p:nvSpPr>
-                <p:spPr>
-                  <a:xfrm>
-                    <a:off x="1005256" y="18701314"/>
-                    <a:ext cx="4800600" cy="486490"/>
-                  </a:xfrm>
-                  <a:prstGeom prst="rect">
-                    <a:avLst/>
-                  </a:prstGeom>
-                  <a:blipFill>
-                    <a:blip r:embed="rId19"/>
-                    <a:stretch>
-                      <a:fillRect/>
-                    </a:stretch>
-                  </a:blipFill>
-                </p:spPr>
-                <p:txBody>
-                  <a:bodyPr/>
-                  <a:lstStyle/>
-                  <a:p>
-                    <a:r>
-                      <a:rPr lang="en-US">
-                        <a:noFill/>
-                      </a:rPr>
-                      <a:t> </a:t>
-                    </a:r>
-                  </a:p>
-                </p:txBody>
-              </p:sp>
-            </mc:Fallback>
-          </mc:AlternateContent>
-          <mc:AlternateContent xmlns:mc="http://schemas.openxmlformats.org/markup-compatibility/2006">
-            <mc:Choice xmlns:a14="http://schemas.microsoft.com/office/drawing/2010/main" Requires="a14">
-              <p:sp>
-                <p:nvSpPr>
-                  <p:cNvPr id="185" name="TextBox 184">
-                    <a:extLst>
-                      <a:ext uri="{FF2B5EF4-FFF2-40B4-BE49-F238E27FC236}">
-                        <a16:creationId xmlns:a16="http://schemas.microsoft.com/office/drawing/2014/main" id="{A88A7A01-EEA8-40FE-A0E7-59FD28DD25EB}"/>
-                      </a:ext>
-                    </a:extLst>
-                  </p:cNvPr>
-                  <p:cNvSpPr txBox="1"/>
-                  <p:nvPr/>
-                </p:nvSpPr>
-                <p:spPr>
-                  <a:xfrm>
-                    <a:off x="1021372" y="16794548"/>
-                    <a:ext cx="4571999" cy="922015"/>
-                  </a:xfrm>
-                  <a:prstGeom prst="rect">
-                    <a:avLst/>
-                  </a:prstGeom>
-                  <a:noFill/>
-                </p:spPr>
-                <p:txBody>
-                  <a:bodyPr wrap="square" lIns="0" tIns="0" rIns="0" bIns="0" rtlCol="0">
-                    <a:spAutoFit/>
-                  </a:bodyPr>
-                  <a:lstStyle/>
-                  <a:p>
-                    <a:pPr/>
-                    <a14:m>
-                      <m:oMathPara xmlns:m="http://schemas.openxmlformats.org/officeDocument/2006/math">
-                        <m:oMathParaPr>
-                          <m:jc m:val="left"/>
-                        </m:oMathParaPr>
-                        <m:oMath xmlns:m="http://schemas.openxmlformats.org/officeDocument/2006/math">
-                          <m:m>
-                            <m:mPr>
-                              <m:mcs>
-                                <m:mc>
-                                  <m:mcPr>
-                                    <m:count m:val="1"/>
-                                    <m:mcJc m:val="center"/>
-                                  </m:mcPr>
-                                </m:mc>
-                              </m:mcs>
-                              <m:ctrlPr>
-                                <a:rPr lang="en-US" sz="2800" b="0" i="1" smtClean="0">
-                                  <a:latin typeface="Cambria Math" panose="02040503050406030204" pitchFamily="18" charset="0"/>
-                                </a:rPr>
-                              </m:ctrlPr>
-                            </m:mPr>
-                            <m:mr>
-                              <m:e>
-                                <m:acc>
-                                  <m:accPr>
-                                    <m:chr m:val="̇"/>
-                                    <m:ctrlPr>
-                                      <a:rPr lang="en-US" sz="2800" b="0" i="1" smtClean="0">
-                                        <a:latin typeface="Cambria Math" panose="02040503050406030204" pitchFamily="18" charset="0"/>
-                                      </a:rPr>
-                                    </m:ctrlPr>
-                                  </m:accPr>
-                                  <m:e>
-                                    <m:r>
-                                      <a:rPr lang="en-US" sz="2800" b="0" i="1" smtClean="0">
-                                        <a:latin typeface="Cambria Math" panose="02040503050406030204" pitchFamily="18" charset="0"/>
-                                      </a:rPr>
-                                      <m:t>𝐼</m:t>
-                                    </m:r>
-                                  </m:e>
-                                </m:acc>
-                                <m:r>
-                                  <m:rPr>
-                                    <m:brk m:alnAt="7"/>
-                                  </m:rPr>
-                                  <a:rPr lang="en-US" sz="2800" b="0" i="1" smtClean="0">
-                                    <a:latin typeface="Cambria Math" panose="02040503050406030204" pitchFamily="18" charset="0"/>
-                                  </a:rPr>
-                                  <m:t>=</m:t>
-                                </m:r>
-                                <m:r>
-                                  <a:rPr lang="en-US" sz="2800" i="1">
-                                    <a:latin typeface="Cambria Math" panose="02040503050406030204" pitchFamily="18" charset="0"/>
-                                  </a:rPr>
-                                  <m:t>𝛽</m:t>
-                                </m:r>
-                                <m:d>
-                                  <m:dPr>
-                                    <m:ctrlPr>
-                                      <a:rPr lang="en-US" sz="2800" i="1" smtClean="0">
-                                        <a:latin typeface="Cambria Math" panose="02040503050406030204" pitchFamily="18" charset="0"/>
-                                      </a:rPr>
-                                    </m:ctrlPr>
-                                  </m:dPr>
-                                  <m:e>
-                                    <m:r>
-                                      <a:rPr lang="en-US" sz="2800" b="0" i="1" smtClean="0">
-                                        <a:latin typeface="Cambria Math" panose="02040503050406030204" pitchFamily="18" charset="0"/>
-                                      </a:rPr>
-                                      <m:t>𝐼</m:t>
-                                    </m:r>
-                                  </m:e>
-                                </m:d>
-                                <m:f>
-                                  <m:fPr>
-                                    <m:ctrlPr>
-                                      <a:rPr lang="en-US" sz="2800" i="1">
-                                        <a:latin typeface="Cambria Math" panose="02040503050406030204" pitchFamily="18" charset="0"/>
-                                      </a:rPr>
-                                    </m:ctrlPr>
-                                  </m:fPr>
-                                  <m:num>
-                                    <m:r>
-                                      <a:rPr lang="en-US" sz="2800" i="1">
-                                        <a:latin typeface="Cambria Math" panose="02040503050406030204" pitchFamily="18" charset="0"/>
-                                      </a:rPr>
-                                      <m:t>𝑆𝐼</m:t>
-                                    </m:r>
-                                  </m:num>
-                                  <m:den>
-                                    <m:r>
-                                      <a:rPr lang="en-US" sz="2800" i="1">
-                                        <a:latin typeface="Cambria Math" panose="02040503050406030204" pitchFamily="18" charset="0"/>
-                                      </a:rPr>
-                                      <m:t>𝑆</m:t>
-                                    </m:r>
-                                    <m:r>
-                                      <a:rPr lang="en-US" sz="2800" i="1">
-                                        <a:latin typeface="Cambria Math" panose="02040503050406030204" pitchFamily="18" charset="0"/>
-                                      </a:rPr>
-                                      <m:t>+</m:t>
-                                    </m:r>
-                                    <m:r>
-                                      <a:rPr lang="en-US" sz="2800" i="1">
-                                        <a:latin typeface="Cambria Math" panose="02040503050406030204" pitchFamily="18" charset="0"/>
-                                      </a:rPr>
-                                      <m:t>𝐼</m:t>
-                                    </m:r>
-                                  </m:den>
-                                </m:f>
-                                <m:r>
-                                  <a:rPr lang="en-US" sz="2800" i="1">
-                                    <a:latin typeface="Cambria Math" panose="02040503050406030204" pitchFamily="18" charset="0"/>
-                                  </a:rPr>
-                                  <m:t>−</m:t>
-                                </m:r>
-                                <m:r>
-                                  <a:rPr lang="en-US" sz="2800" i="1">
-                                    <a:latin typeface="Cambria Math" panose="02040503050406030204" pitchFamily="18" charset="0"/>
-                                  </a:rPr>
-                                  <m:t>𝛾</m:t>
-                                </m:r>
-                                <m:r>
-                                  <a:rPr lang="en-US" sz="2800" i="1">
-                                    <a:latin typeface="Cambria Math" panose="02040503050406030204" pitchFamily="18" charset="0"/>
-                                  </a:rPr>
-                                  <m:t>𝐼</m:t>
-                                </m:r>
-                                <m:r>
-                                  <a:rPr lang="en-US" sz="2800" i="1">
-                                    <a:latin typeface="Cambria Math" panose="02040503050406030204" pitchFamily="18" charset="0"/>
-                                  </a:rPr>
-                                  <m:t>−</m:t>
-                                </m:r>
-                                <m:r>
-                                  <a:rPr lang="en-US" sz="2800" b="0" i="1" smtClean="0">
-                                    <a:latin typeface="Cambria Math" panose="02040503050406030204" pitchFamily="18" charset="0"/>
-                                  </a:rPr>
-                                  <m:t>𝜈</m:t>
-                                </m:r>
-                                <m:r>
-                                  <a:rPr lang="en-US" sz="2800" i="1">
-                                    <a:latin typeface="Cambria Math" panose="02040503050406030204" pitchFamily="18" charset="0"/>
-                                  </a:rPr>
-                                  <m:t>𝐼</m:t>
-                                </m:r>
-                              </m:e>
-                            </m:mr>
-                          </m:m>
-                        </m:oMath>
-                      </m:oMathPara>
-                    </a14:m>
-                    <a:endParaRPr lang="en-US" sz="2800" dirty="0"/>
-                  </a:p>
-                </p:txBody>
-              </p:sp>
-            </mc:Choice>
-            <mc:Fallback>
-              <p:sp>
-                <p:nvSpPr>
-                  <p:cNvPr id="185" name="TextBox 184">
-                    <a:extLst>
-                      <a:ext uri="{FF2B5EF4-FFF2-40B4-BE49-F238E27FC236}">
-                        <a16:creationId xmlns:a16="http://schemas.microsoft.com/office/drawing/2014/main" id="{A88A7A01-EEA8-40FE-A0E7-59FD28DD25EB}"/>
-                      </a:ext>
-                    </a:extLst>
-                  </p:cNvPr>
-                  <p:cNvSpPr txBox="1">
-                    <a:spLocks noRot="1" noChangeAspect="1" noMove="1" noResize="1" noEditPoints="1" noAdjustHandles="1" noChangeArrowheads="1" noChangeShapeType="1" noTextEdit="1"/>
-                  </p:cNvSpPr>
-                  <p:nvPr/>
-                </p:nvSpPr>
-                <p:spPr>
-                  <a:xfrm>
-                    <a:off x="1021372" y="16794548"/>
-                    <a:ext cx="4571999" cy="922015"/>
-                  </a:xfrm>
-                  <a:prstGeom prst="rect">
-                    <a:avLst/>
-                  </a:prstGeom>
-                  <a:blipFill>
-                    <a:blip r:embed="rId20"/>
-                    <a:stretch>
-                      <a:fillRect/>
-                    </a:stretch>
-                  </a:blipFill>
-                </p:spPr>
-                <p:txBody>
-                  <a:bodyPr/>
-                  <a:lstStyle/>
-                  <a:p>
-                    <a:r>
-                      <a:rPr lang="en-US">
-                        <a:noFill/>
-                      </a:rPr>
-                      <a:t> </a:t>
-                    </a:r>
-                  </a:p>
-                </p:txBody>
-              </p:sp>
-            </mc:Fallback>
-          </mc:AlternateContent>
-          <mc:AlternateContent xmlns:mc="http://schemas.openxmlformats.org/markup-compatibility/2006">
-            <mc:Choice xmlns:a14="http://schemas.microsoft.com/office/drawing/2010/main" Requires="a14">
-              <p:sp>
-                <p:nvSpPr>
-                  <p:cNvPr id="186" name="TextBox 185">
-                    <a:extLst>
-                      <a:ext uri="{FF2B5EF4-FFF2-40B4-BE49-F238E27FC236}">
-                        <a16:creationId xmlns:a16="http://schemas.microsoft.com/office/drawing/2014/main" id="{C3A44E2C-6F65-49A8-91C2-7947D4A500F3}"/>
-                      </a:ext>
-                    </a:extLst>
-                  </p:cNvPr>
-                  <p:cNvSpPr txBox="1"/>
-                  <p:nvPr/>
-                </p:nvSpPr>
-                <p:spPr>
-                  <a:xfrm>
-                    <a:off x="1042705" y="15678897"/>
-                    <a:ext cx="4800601" cy="922015"/>
-                  </a:xfrm>
-                  <a:prstGeom prst="rect">
-                    <a:avLst/>
-                  </a:prstGeom>
-                  <a:noFill/>
-                </p:spPr>
-                <p:txBody>
-                  <a:bodyPr wrap="square" lIns="0" tIns="0" rIns="0" bIns="0" rtlCol="0">
-                    <a:spAutoFit/>
-                  </a:bodyPr>
-                  <a:lstStyle/>
-                  <a:p>
-                    <a:pPr/>
-                    <a14:m>
-                      <m:oMathPara xmlns:m="http://schemas.openxmlformats.org/officeDocument/2006/math">
-                        <m:oMathParaPr>
-                          <m:jc m:val="left"/>
-                        </m:oMathParaPr>
-                        <m:oMath xmlns:m="http://schemas.openxmlformats.org/officeDocument/2006/math">
-                          <m:m>
-                            <m:mPr>
-                              <m:mcs>
-                                <m:mc>
-                                  <m:mcPr>
-                                    <m:count m:val="1"/>
-                                    <m:mcJc m:val="center"/>
-                                  </m:mcPr>
-                                </m:mc>
-                              </m:mcs>
-                              <m:ctrlPr>
-                                <a:rPr lang="en-US" sz="2800" b="0" i="1" smtClean="0">
-                                  <a:latin typeface="Cambria Math" panose="02040503050406030204" pitchFamily="18" charset="0"/>
-                                </a:rPr>
-                              </m:ctrlPr>
-                            </m:mPr>
-                            <m:mr>
-                              <m:e>
-                                <m:acc>
-                                  <m:accPr>
-                                    <m:chr m:val="̇"/>
-                                    <m:ctrlPr>
-                                      <a:rPr lang="en-US" sz="2800" b="0" i="1" smtClean="0">
-                                        <a:latin typeface="Cambria Math" panose="02040503050406030204" pitchFamily="18" charset="0"/>
-                                      </a:rPr>
-                                    </m:ctrlPr>
-                                  </m:accPr>
-                                  <m:e>
-                                    <m:r>
-                                      <a:rPr lang="en-US" sz="2800" b="0" i="1" smtClean="0">
-                                        <a:latin typeface="Cambria Math" panose="02040503050406030204" pitchFamily="18" charset="0"/>
-                                      </a:rPr>
-                                      <m:t>𝑆</m:t>
-                                    </m:r>
-                                  </m:e>
-                                </m:acc>
-                                <m:r>
-                                  <m:rPr>
-                                    <m:brk m:alnAt="7"/>
-                                  </m:rPr>
-                                  <a:rPr lang="en-US" sz="2800" b="0" i="1" smtClean="0">
-                                    <a:latin typeface="Cambria Math" panose="02040503050406030204" pitchFamily="18" charset="0"/>
-                                  </a:rPr>
-                                  <m:t>=</m:t>
-                                </m:r>
-                                <m:r>
-                                  <a:rPr lang="en-US" sz="2800" b="0" i="1" smtClean="0">
-                                    <a:latin typeface="Cambria Math" panose="02040503050406030204" pitchFamily="18" charset="0"/>
-                                  </a:rPr>
-                                  <m:t>−</m:t>
-                                </m:r>
-                                <m:r>
-                                  <a:rPr lang="en-US" sz="2800" i="1">
-                                    <a:latin typeface="Cambria Math" panose="02040503050406030204" pitchFamily="18" charset="0"/>
-                                  </a:rPr>
-                                  <m:t>𝛽</m:t>
-                                </m:r>
-                                <m:d>
-                                  <m:dPr>
-                                    <m:ctrlPr>
-                                      <a:rPr lang="en-US" sz="2800" i="1" smtClean="0">
-                                        <a:latin typeface="Cambria Math" panose="02040503050406030204" pitchFamily="18" charset="0"/>
-                                      </a:rPr>
-                                    </m:ctrlPr>
-                                  </m:dPr>
-                                  <m:e>
-                                    <m:r>
-                                      <a:rPr lang="en-US" sz="2800" b="0" i="1" smtClean="0">
-                                        <a:latin typeface="Cambria Math" panose="02040503050406030204" pitchFamily="18" charset="0"/>
-                                      </a:rPr>
-                                      <m:t>𝐼</m:t>
-                                    </m:r>
-                                  </m:e>
-                                </m:d>
-                                <m:f>
-                                  <m:fPr>
-                                    <m:ctrlPr>
-                                      <a:rPr lang="en-US" sz="2800" i="1">
-                                        <a:latin typeface="Cambria Math" panose="02040503050406030204" pitchFamily="18" charset="0"/>
-                                      </a:rPr>
-                                    </m:ctrlPr>
-                                  </m:fPr>
-                                  <m:num>
-                                    <m:r>
-                                      <a:rPr lang="en-US" sz="2800" i="1">
-                                        <a:latin typeface="Cambria Math" panose="02040503050406030204" pitchFamily="18" charset="0"/>
-                                      </a:rPr>
-                                      <m:t>𝑆𝐼</m:t>
-                                    </m:r>
-                                  </m:num>
-                                  <m:den>
-                                    <m:r>
-                                      <a:rPr lang="en-US" sz="2800" i="1">
-                                        <a:latin typeface="Cambria Math" panose="02040503050406030204" pitchFamily="18" charset="0"/>
-                                      </a:rPr>
-                                      <m:t>𝑆</m:t>
-                                    </m:r>
-                                    <m:r>
-                                      <a:rPr lang="en-US" sz="2800" i="1">
-                                        <a:latin typeface="Cambria Math" panose="02040503050406030204" pitchFamily="18" charset="0"/>
-                                      </a:rPr>
-                                      <m:t>+</m:t>
-                                    </m:r>
-                                    <m:r>
-                                      <a:rPr lang="en-US" sz="2800" i="1">
-                                        <a:latin typeface="Cambria Math" panose="02040503050406030204" pitchFamily="18" charset="0"/>
-                                      </a:rPr>
-                                      <m:t>𝐼</m:t>
-                                    </m:r>
-                                  </m:den>
-                                </m:f>
-                                <m:r>
-                                  <a:rPr lang="en-US" sz="2800" b="0" i="1" smtClean="0">
-                                    <a:latin typeface="Cambria Math" panose="02040503050406030204" pitchFamily="18" charset="0"/>
-                                  </a:rPr>
-                                  <m:t>−</m:t>
-                                </m:r>
-                                <m:r>
-                                  <a:rPr lang="en-US" sz="2800" b="0" i="1" smtClean="0">
-                                    <a:latin typeface="Cambria Math" panose="02040503050406030204" pitchFamily="18" charset="0"/>
-                                  </a:rPr>
-                                  <m:t>𝛼</m:t>
-                                </m:r>
-                                <m:r>
-                                  <a:rPr lang="en-US" sz="2800" b="0" i="1" smtClean="0">
-                                    <a:solidFill>
-                                      <a:srgbClr val="C00000"/>
-                                    </a:solidFill>
-                                    <a:latin typeface="Cambria Math" panose="02040503050406030204" pitchFamily="18" charset="0"/>
-                                  </a:rPr>
-                                  <m:t>𝑉</m:t>
-                                </m:r>
-                              </m:e>
-                            </m:mr>
-                          </m:m>
-                        </m:oMath>
-                      </m:oMathPara>
-                    </a14:m>
-                    <a:endParaRPr lang="en-US" sz="2800" dirty="0"/>
-                  </a:p>
-                </p:txBody>
-              </p:sp>
-            </mc:Choice>
-            <mc:Fallback>
-              <p:sp>
-                <p:nvSpPr>
-                  <p:cNvPr id="186" name="TextBox 185">
-                    <a:extLst>
-                      <a:ext uri="{FF2B5EF4-FFF2-40B4-BE49-F238E27FC236}">
-                        <a16:creationId xmlns:a16="http://schemas.microsoft.com/office/drawing/2014/main" id="{C3A44E2C-6F65-49A8-91C2-7947D4A500F3}"/>
-                      </a:ext>
-                    </a:extLst>
-                  </p:cNvPr>
-                  <p:cNvSpPr txBox="1">
-                    <a:spLocks noRot="1" noChangeAspect="1" noMove="1" noResize="1" noEditPoints="1" noAdjustHandles="1" noChangeArrowheads="1" noChangeShapeType="1" noTextEdit="1"/>
-                  </p:cNvSpPr>
-                  <p:nvPr/>
-                </p:nvSpPr>
-                <p:spPr>
-                  <a:xfrm>
-                    <a:off x="1042705" y="15678897"/>
-                    <a:ext cx="4800601" cy="922015"/>
-                  </a:xfrm>
-                  <a:prstGeom prst="rect">
-                    <a:avLst/>
-                  </a:prstGeom>
-                  <a:blipFill>
-                    <a:blip r:embed="rId21"/>
-                    <a:stretch>
-                      <a:fillRect/>
-                    </a:stretch>
-                  </a:blipFill>
-                </p:spPr>
-                <p:txBody>
-                  <a:bodyPr/>
-                  <a:lstStyle/>
-                  <a:p>
-                    <a:r>
-                      <a:rPr lang="en-US">
-                        <a:noFill/>
-                      </a:rPr>
-                      <a:t> </a:t>
-                    </a:r>
-                  </a:p>
-                </p:txBody>
-              </p:sp>
-            </mc:Fallback>
-          </mc:AlternateContent>
-          <mc:AlternateContent xmlns:mc="http://schemas.openxmlformats.org/markup-compatibility/2006">
-            <mc:Choice xmlns:a14="http://schemas.microsoft.com/office/drawing/2010/main" Requires="a14">
-              <p:sp>
-                <p:nvSpPr>
-                  <p:cNvPr id="187" name="TextBox 186">
-                    <a:extLst>
-                      <a:ext uri="{FF2B5EF4-FFF2-40B4-BE49-F238E27FC236}">
-                        <a16:creationId xmlns:a16="http://schemas.microsoft.com/office/drawing/2014/main" id="{25E3899D-5F9E-4668-90AC-A98A7F6C49A4}"/>
-                      </a:ext>
-                    </a:extLst>
-                  </p:cNvPr>
-                  <p:cNvSpPr txBox="1"/>
-                  <p:nvPr/>
-                </p:nvSpPr>
-                <p:spPr>
-                  <a:xfrm>
-                    <a:off x="1012466" y="17927276"/>
-                    <a:ext cx="4800600" cy="491051"/>
-                  </a:xfrm>
-                  <a:prstGeom prst="rect">
-                    <a:avLst/>
-                  </a:prstGeom>
-                  <a:noFill/>
-                </p:spPr>
-                <p:txBody>
-                  <a:bodyPr wrap="square" lIns="0" tIns="0" rIns="0" bIns="0" rtlCol="0">
-                    <a:spAutoFit/>
-                  </a:bodyPr>
-                  <a:lstStyle/>
-                  <a:p>
-                    <a:pPr/>
-                    <a14:m>
-                      <m:oMathPara xmlns:m="http://schemas.openxmlformats.org/officeDocument/2006/math">
-                        <m:oMathParaPr>
-                          <m:jc m:val="left"/>
-                        </m:oMathParaPr>
-                        <m:oMath xmlns:m="http://schemas.openxmlformats.org/officeDocument/2006/math">
-                          <m:m>
-                            <m:mPr>
-                              <m:mcs>
-                                <m:mc>
-                                  <m:mcPr>
-                                    <m:count m:val="1"/>
-                                    <m:mcJc m:val="center"/>
-                                  </m:mcPr>
-                                </m:mc>
-                              </m:mcs>
-                              <m:ctrlPr>
-                                <a:rPr lang="en-US" sz="2800" b="0" i="1" smtClean="0">
-                                  <a:latin typeface="Cambria Math" panose="02040503050406030204" pitchFamily="18" charset="0"/>
-                                </a:rPr>
-                              </m:ctrlPr>
-                            </m:mPr>
-                            <m:mr>
-                              <m:e>
-                                <m:acc>
-                                  <m:accPr>
-                                    <m:chr m:val="̇"/>
-                                    <m:ctrlPr>
-                                      <a:rPr lang="en-US" sz="2800" b="0" i="1" smtClean="0">
-                                        <a:latin typeface="Cambria Math" panose="02040503050406030204" pitchFamily="18" charset="0"/>
-                                      </a:rPr>
-                                    </m:ctrlPr>
-                                  </m:accPr>
-                                  <m:e>
-                                    <m:r>
-                                      <a:rPr lang="en-US" sz="2800" b="0" i="1" smtClean="0">
-                                        <a:latin typeface="Cambria Math" panose="02040503050406030204" pitchFamily="18" charset="0"/>
-                                      </a:rPr>
-                                      <m:t>𝑅</m:t>
-                                    </m:r>
-                                  </m:e>
-                                </m:acc>
-                                <m:r>
-                                  <m:rPr>
-                                    <m:brk m:alnAt="7"/>
-                                  </m:rPr>
-                                  <a:rPr lang="en-US" sz="2800" b="0" i="1" smtClean="0">
-                                    <a:latin typeface="Cambria Math" panose="02040503050406030204" pitchFamily="18" charset="0"/>
-                                  </a:rPr>
-                                  <m:t>=</m:t>
-                                </m:r>
-                                <m:r>
-                                  <a:rPr lang="en-US" sz="2800" i="1">
-                                    <a:latin typeface="Cambria Math" panose="02040503050406030204" pitchFamily="18" charset="0"/>
-                                  </a:rPr>
-                                  <m:t>𝛾</m:t>
-                                </m:r>
-                                <m:r>
-                                  <a:rPr lang="en-US" sz="2800" i="1">
-                                    <a:latin typeface="Cambria Math" panose="02040503050406030204" pitchFamily="18" charset="0"/>
-                                  </a:rPr>
-                                  <m:t>𝐼</m:t>
-                                </m:r>
-                                <m:r>
-                                  <a:rPr lang="en-US" sz="2800" b="0" i="1" smtClean="0">
-                                    <a:latin typeface="Cambria Math" panose="02040503050406030204" pitchFamily="18" charset="0"/>
-                                  </a:rPr>
-                                  <m:t>−</m:t>
-                                </m:r>
-                                <m:d>
-                                  <m:dPr>
-                                    <m:ctrlPr>
-                                      <a:rPr lang="en-US" sz="2800" b="0" i="1" smtClean="0">
-                                        <a:latin typeface="Cambria Math" panose="02040503050406030204" pitchFamily="18" charset="0"/>
-                                      </a:rPr>
-                                    </m:ctrlPr>
-                                  </m:dPr>
-                                  <m:e>
-                                    <m:r>
-                                      <a:rPr lang="en-US" sz="2800" b="0" i="1" smtClean="0">
-                                        <a:latin typeface="Cambria Math" panose="02040503050406030204" pitchFamily="18" charset="0"/>
-                                      </a:rPr>
-                                      <m:t>1−</m:t>
-                                    </m:r>
-                                    <m:r>
-                                      <a:rPr lang="en-US" sz="2800" b="0" i="1" smtClean="0">
-                                        <a:latin typeface="Cambria Math" panose="02040503050406030204" pitchFamily="18" charset="0"/>
-                                      </a:rPr>
-                                      <m:t>𝛼</m:t>
-                                    </m:r>
-                                  </m:e>
-                                </m:d>
-                                <m:r>
-                                  <a:rPr lang="en-US" sz="2800" b="0" i="1" smtClean="0">
-                                    <a:solidFill>
-                                      <a:srgbClr val="C00000"/>
-                                    </a:solidFill>
-                                    <a:latin typeface="Cambria Math" panose="02040503050406030204" pitchFamily="18" charset="0"/>
-                                  </a:rPr>
-                                  <m:t>𝑉</m:t>
-                                </m:r>
-                              </m:e>
-                            </m:mr>
-                          </m:m>
-                        </m:oMath>
-                      </m:oMathPara>
-                    </a14:m>
-                    <a:endParaRPr lang="en-US" sz="2800" dirty="0"/>
-                  </a:p>
-                </p:txBody>
-              </p:sp>
-            </mc:Choice>
-            <mc:Fallback>
-              <p:sp>
-                <p:nvSpPr>
-                  <p:cNvPr id="187" name="TextBox 186">
-                    <a:extLst>
-                      <a:ext uri="{FF2B5EF4-FFF2-40B4-BE49-F238E27FC236}">
-                        <a16:creationId xmlns:a16="http://schemas.microsoft.com/office/drawing/2014/main" id="{25E3899D-5F9E-4668-90AC-A98A7F6C49A4}"/>
-                      </a:ext>
-                    </a:extLst>
-                  </p:cNvPr>
-                  <p:cNvSpPr txBox="1">
-                    <a:spLocks noRot="1" noChangeAspect="1" noMove="1" noResize="1" noEditPoints="1" noAdjustHandles="1" noChangeArrowheads="1" noChangeShapeType="1" noTextEdit="1"/>
-                  </p:cNvSpPr>
-                  <p:nvPr/>
-                </p:nvSpPr>
-                <p:spPr>
-                  <a:xfrm>
-                    <a:off x="1012466" y="17927276"/>
-                    <a:ext cx="4800600" cy="491051"/>
-                  </a:xfrm>
-                  <a:prstGeom prst="rect">
-                    <a:avLst/>
-                  </a:prstGeom>
-                  <a:blipFill>
-                    <a:blip r:embed="rId22"/>
-                    <a:stretch>
-                      <a:fillRect/>
-                    </a:stretch>
-                  </a:blipFill>
-                </p:spPr>
-                <p:txBody>
-                  <a:bodyPr/>
-                  <a:lstStyle/>
-                  <a:p>
-                    <a:r>
-                      <a:rPr lang="en-US">
-                        <a:noFill/>
-                      </a:rPr>
-                      <a:t> </a:t>
-                    </a:r>
-                  </a:p>
-                </p:txBody>
-              </p:sp>
-            </mc:Fallback>
-          </mc:AlternateContent>
-        </p:grpSp>
-        <p:sp>
-          <p:nvSpPr>
-            <p:cNvPr id="182" name="Right Arrow 91">
-              <a:extLst>
-                <a:ext uri="{FF2B5EF4-FFF2-40B4-BE49-F238E27FC236}">
-                  <a16:creationId xmlns:a16="http://schemas.microsoft.com/office/drawing/2014/main" id="{E3FD093D-CA80-4FEC-831C-EB3FA2D08234}"/>
-                </a:ext>
-              </a:extLst>
-            </p:cNvPr>
-            <p:cNvSpPr/>
-            <p:nvPr/>
-          </p:nvSpPr>
-          <p:spPr>
-            <a:xfrm>
-              <a:off x="7618055" y="2679405"/>
-              <a:ext cx="354923" cy="597909"/>
-            </a:xfrm>
-            <a:prstGeom prst="rightArrow">
-              <a:avLst/>
-            </a:prstGeom>
-          </p:spPr>
-          <p:style>
-            <a:lnRef idx="2">
-              <a:schemeClr val="accent1">
-                <a:shade val="50000"/>
-              </a:schemeClr>
-            </a:lnRef>
-            <a:fillRef idx="1">
-              <a:schemeClr val="accent1"/>
-            </a:fillRef>
-            <a:effectRef idx="0">
-              <a:schemeClr val="accent1"/>
-            </a:effectRef>
-            <a:fontRef idx="minor">
-              <a:schemeClr val="lt1"/>
-            </a:fontRef>
-          </p:style>
-          <p:txBody>
-            <a:bodyPr rtlCol="0" anchor="ctr"/>
-            <a:lstStyle/>
-            <a:p>
-              <a:pPr algn="ctr"/>
-              <a:endParaRPr lang="en-US"/>
-            </a:p>
-          </p:txBody>
-        </p:sp>
-      </p:grpSp>
       <p:sp>
         <p:nvSpPr>
           <p:cNvPr id="188" name="Rectangle 187">
@@ -11741,8 +10413,8 @@
         </p:nvSpPr>
         <p:spPr>
           <a:xfrm>
-            <a:off x="14585239" y="15683888"/>
-            <a:ext cx="13945004" cy="6494085"/>
+            <a:off x="14971468" y="17653367"/>
+            <a:ext cx="13627351" cy="5740033"/>
           </a:xfrm>
           <a:prstGeom prst="rect">
             <a:avLst/>
@@ -11759,7 +10431,7 @@
                 <a:spcPts val="0"/>
               </a:spcBef>
               <a:spcAft>
-                <a:spcPts val="0"/>
+                <a:spcPts val="1800"/>
               </a:spcAft>
               <a:defRPr/>
             </a:pPr>
@@ -11771,7 +10443,7 @@
                 <a:latin typeface="Calibri"/>
                 <a:cs typeface="Arial" pitchFamily="34" charset="0"/>
               </a:rPr>
-              <a:t>Due to the transmission rate being constant in the SIRD model, any prediction can only show an unconstrained outbreak or decay of the disease. In predicting an unconstrained outbreak, the number of infections rises exponentially until there are no remaining susceptibles to infect.</a:t>
+              <a:t>The standard SIRD model uses constant transmission rate and therefore any prediction can only show an unconstrained outbreak or decay of the disease. In predicting an unconstrained outbreak, the number of infections rises exponentially until there are no remaining susceptibles to infect.</a:t>
             </a:r>
           </a:p>
           <a:p>
@@ -11780,25 +10452,7 @@
                 <a:spcPts val="0"/>
               </a:spcBef>
               <a:spcAft>
-                <a:spcPts val="0"/>
-              </a:spcAft>
-              <a:defRPr/>
-            </a:pPr>
-            <a:endParaRPr lang="en-US" sz="3200" dirty="0">
-              <a:solidFill>
-                <a:prstClr val="black"/>
-              </a:solidFill>
-              <a:latin typeface="Calibri"/>
-              <a:cs typeface="Arial" pitchFamily="34" charset="0"/>
-            </a:endParaRPr>
-          </a:p>
-          <a:p>
-            <a:pPr lvl="0" defTabSz="3574551">
-              <a:spcBef>
-                <a:spcPts val="0"/>
-              </a:spcBef>
-              <a:spcAft>
-                <a:spcPts val="0"/>
+                <a:spcPts val="1800"/>
               </a:spcAft>
               <a:defRPr/>
             </a:pPr>
@@ -11810,7 +10464,7 @@
                 <a:latin typeface="Calibri"/>
                 <a:cs typeface="Arial" pitchFamily="34" charset="0"/>
               </a:rPr>
-              <a:t>Unlike the SIRD model, the feedback model is capable of predicting times of increasing and decreasing infections due to the allowance of the transmission rate changing over time. By assuming the local population has some delay in how it can react to new case data, either by naturally distancing or formal health guidelines being put into place, we find that the transmission rate can be modeled with a greater accuracy than the standard SIRD model. This allows for the feedback model to be accurate for a longer duration, while the standard SIRD model deviates rapidly after some period.</a:t>
+              <a:t>Unlike the SIRD model, the feedback model can predict increasing and decreasing infections due to the adaptive nature of the transmission rate. By assuming the local population has some delay in how it can react to new case data, either by naturally distancing or formal health guidelines being put into place, we find that the transmission rate can be modeled with a greater accuracy than the standard SIRD model. This allows for the feedback model to be accurate for a longer duration, while the standard SIRD model deviates rapidly after some period.</a:t>
             </a:r>
           </a:p>
         </p:txBody>
@@ -11829,8 +10483,8 @@
         </p:nvSpPr>
         <p:spPr>
           <a:xfrm>
-            <a:off x="29822009" y="9200682"/>
-            <a:ext cx="13302760" cy="6494085"/>
+            <a:off x="29822009" y="9296400"/>
+            <a:ext cx="13663446" cy="5478423"/>
           </a:xfrm>
           <a:prstGeom prst="rect">
             <a:avLst/>
@@ -11847,7 +10501,7 @@
                 <a:spcPts val="0"/>
               </a:spcBef>
               <a:spcAft>
-                <a:spcPts val="0"/>
+                <a:spcPts val="1800"/>
               </a:spcAft>
               <a:defRPr/>
             </a:pPr>
@@ -11859,7 +10513,7 @@
                 <a:latin typeface="Calibri"/>
                 <a:cs typeface="Arial" pitchFamily="34" charset="0"/>
               </a:rPr>
-              <a:t>Both the SIRD and SIRD feedback model can be adapted to incorporate vaccinations. To do this we assume both recovered and susceptible populations get vaccinated at the same rate.</a:t>
+              <a:t>Both the SIRD and SIRD feedback model can be adapted to incorporate vaccinations. We make the assumption both recovered and susceptible populations get vaccinated at the same rate.</a:t>
             </a:r>
           </a:p>
           <a:p>
@@ -11868,25 +10522,7 @@
                 <a:spcPts val="0"/>
               </a:spcBef>
               <a:spcAft>
-                <a:spcPts val="0"/>
-              </a:spcAft>
-              <a:defRPr/>
-            </a:pPr>
-            <a:endParaRPr lang="en-US" sz="3200" dirty="0">
-              <a:solidFill>
-                <a:prstClr val="black"/>
-              </a:solidFill>
-              <a:latin typeface="Calibri"/>
-              <a:cs typeface="Arial" pitchFamily="34" charset="0"/>
-            </a:endParaRPr>
-          </a:p>
-          <a:p>
-            <a:pPr lvl="0" defTabSz="3574551">
-              <a:spcBef>
-                <a:spcPts val="0"/>
-              </a:spcBef>
-              <a:spcAft>
-                <a:spcPts val="0"/>
+                <a:spcPts val="1800"/>
               </a:spcAft>
               <a:defRPr/>
             </a:pPr>
@@ -11898,7 +10534,7 @@
                 <a:latin typeface="Calibri"/>
                 <a:cs typeface="Arial" pitchFamily="34" charset="0"/>
               </a:rPr>
-              <a:t>Due to the low number of vaccinations when current infections were high, little difference is found in comparing the accuracy of the vaccinated with the standard models of SIRD and SIRD feedback. Only during times of high infections will the number of vaccinations significantly impact the number of newly infected individuals.</a:t>
+              <a:t>Little difference is found in comparing the accuracy of the vaccinated with the standard models of SIRD and SIRD feedback when there is low number of vaccinations and current infections are high. </a:t>
             </a:r>
           </a:p>
           <a:p>
@@ -11907,25 +10543,7 @@
                 <a:spcPts val="0"/>
               </a:spcBef>
               <a:spcAft>
-                <a:spcPts val="0"/>
-              </a:spcAft>
-              <a:defRPr/>
-            </a:pPr>
-            <a:endParaRPr lang="en-US" sz="3200" dirty="0">
-              <a:solidFill>
-                <a:prstClr val="black"/>
-              </a:solidFill>
-              <a:latin typeface="Calibri"/>
-              <a:cs typeface="Arial" pitchFamily="34" charset="0"/>
-            </a:endParaRPr>
-          </a:p>
-          <a:p>
-            <a:pPr lvl="0" defTabSz="3574551">
-              <a:spcBef>
-                <a:spcPts val="0"/>
-              </a:spcBef>
-              <a:spcAft>
-                <a:spcPts val="0"/>
+                <a:spcPts val="1800"/>
               </a:spcAft>
               <a:defRPr/>
             </a:pPr>
@@ -11937,348 +10555,11 @@
                 <a:latin typeface="Calibri"/>
                 <a:cs typeface="Arial" pitchFamily="34" charset="0"/>
               </a:rPr>
-              <a:t>While high vaccinations may make a minor difference in times when the disease is decaying, high vaccinations are capable of curbing another wave of the infection, preventing further deaths.</a:t>
+              <a:t>When the number of infections is high, the number of vaccinations will significantly impact the number of newly infected individuals. Thus, high vaccinations are capable of curbing additional waves of the infection, preventing further deaths.</a:t>
             </a:r>
           </a:p>
         </p:txBody>
       </p:sp>
-      <p:sp>
-        <p:nvSpPr>
-          <p:cNvPr id="192" name="Content Placeholder 5">
-            <a:extLst>
-              <a:ext uri="{FF2B5EF4-FFF2-40B4-BE49-F238E27FC236}">
-                <a16:creationId xmlns:a16="http://schemas.microsoft.com/office/drawing/2014/main" id="{1FBF8E79-18EB-4F08-9A4C-DD615BCA0B6E}"/>
-              </a:ext>
-            </a:extLst>
-          </p:cNvPr>
-          <p:cNvSpPr txBox="1">
-            <a:spLocks/>
-          </p:cNvSpPr>
-          <p:nvPr/>
-        </p:nvSpPr>
-        <p:spPr bwMode="auto">
-          <a:xfrm>
-            <a:off x="155734" y="25783368"/>
-            <a:ext cx="10348462" cy="1738190"/>
-          </a:xfrm>
-          <a:prstGeom prst="rect">
-            <a:avLst/>
-          </a:prstGeom>
-          <a:noFill/>
-          <a:ln w="9525">
-            <a:noFill/>
-            <a:miter lim="800000"/>
-            <a:headEnd/>
-            <a:tailEnd/>
-          </a:ln>
-        </p:spPr>
-        <p:txBody>
-          <a:bodyPr vert="horz" wrap="square" lIns="464848" tIns="232422" rIns="464848" bIns="232422" numCol="1" anchor="t" anchorCtr="0" compatLnSpc="1">
-            <a:prstTxWarp prst="textNoShape">
-              <a:avLst/>
-            </a:prstTxWarp>
-          </a:bodyPr>
-          <a:lstStyle>
-            <a:lvl1pPr marL="1339154" indent="-1339154" algn="l" defTabSz="3574333" rtl="0" eaLnBrk="0" fontAlgn="base" hangingPunct="0">
-              <a:spcBef>
-                <a:spcPct val="20000"/>
-              </a:spcBef>
-              <a:spcAft>
-                <a:spcPct val="0"/>
-              </a:spcAft>
-              <a:buFont typeface="Arial" charset="0"/>
-              <a:buChar char="•"/>
-              <a:defRPr sz="9153" kern="1200">
-                <a:solidFill>
-                  <a:schemeClr val="tx1"/>
-                </a:solidFill>
-                <a:latin typeface="+mn-lt"/>
-                <a:ea typeface="+mn-ea"/>
-                <a:cs typeface="+mn-cs"/>
-              </a:defRPr>
-            </a:lvl1pPr>
-            <a:lvl2pPr marL="2904150" indent="-1115760" algn="l" defTabSz="3574333" rtl="0" eaLnBrk="0" fontAlgn="base" hangingPunct="0">
-              <a:spcBef>
-                <a:spcPct val="20000"/>
-              </a:spcBef>
-              <a:spcAft>
-                <a:spcPct val="0"/>
-              </a:spcAft>
-              <a:buFont typeface="Arial" charset="0"/>
-              <a:buChar char="–"/>
-              <a:defRPr sz="7692" kern="1200">
-                <a:solidFill>
-                  <a:schemeClr val="tx1"/>
-                </a:solidFill>
-                <a:latin typeface="+mn-lt"/>
-                <a:ea typeface="+mn-ea"/>
-                <a:cs typeface="+mn-cs"/>
-              </a:defRPr>
-            </a:lvl2pPr>
-            <a:lvl3pPr marL="4467921" indent="-892366" algn="l" defTabSz="3574333" rtl="0" eaLnBrk="0" fontAlgn="base" hangingPunct="0">
-              <a:spcBef>
-                <a:spcPct val="20000"/>
-              </a:spcBef>
-              <a:spcAft>
-                <a:spcPct val="0"/>
-              </a:spcAft>
-              <a:buFont typeface="Arial" charset="0"/>
-              <a:buChar char="•"/>
-              <a:defRPr sz="7000" kern="1200">
-                <a:solidFill>
-                  <a:schemeClr val="tx1"/>
-                </a:solidFill>
-                <a:latin typeface="+mn-lt"/>
-                <a:ea typeface="+mn-ea"/>
-                <a:cs typeface="+mn-cs"/>
-              </a:defRPr>
-            </a:lvl3pPr>
-            <a:lvl4pPr marL="6256307" indent="-892366" algn="l" defTabSz="3574333" rtl="0" eaLnBrk="0" fontAlgn="base" hangingPunct="0">
-              <a:spcBef>
-                <a:spcPct val="20000"/>
-              </a:spcBef>
-              <a:spcAft>
-                <a:spcPct val="0"/>
-              </a:spcAft>
-              <a:buFont typeface="Arial" charset="0"/>
-              <a:buChar char="–"/>
-              <a:defRPr sz="6307" kern="1200">
-                <a:solidFill>
-                  <a:schemeClr val="tx1"/>
-                </a:solidFill>
-                <a:latin typeface="+mn-lt"/>
-                <a:ea typeface="+mn-ea"/>
-                <a:cs typeface="+mn-cs"/>
-              </a:defRPr>
-            </a:lvl4pPr>
-            <a:lvl5pPr marL="8043476" indent="-892366" algn="l" defTabSz="3574333" rtl="0" eaLnBrk="0" fontAlgn="base" hangingPunct="0">
-              <a:spcBef>
-                <a:spcPct val="20000"/>
-              </a:spcBef>
-              <a:spcAft>
-                <a:spcPct val="0"/>
-              </a:spcAft>
-              <a:buFont typeface="Arial" charset="0"/>
-              <a:buChar char="»"/>
-              <a:defRPr sz="6307" kern="1200">
-                <a:solidFill>
-                  <a:schemeClr val="tx1"/>
-                </a:solidFill>
-                <a:latin typeface="+mn-lt"/>
-                <a:ea typeface="+mn-ea"/>
-                <a:cs typeface="+mn-cs"/>
-              </a:defRPr>
-            </a:lvl5pPr>
-            <a:lvl6pPr marL="9832860" indent="-893897" algn="l" defTabSz="3575587" rtl="0" eaLnBrk="1" latinLnBrk="0" hangingPunct="1">
-              <a:spcBef>
-                <a:spcPct val="20000"/>
-              </a:spcBef>
-              <a:buFont typeface="Arial" pitchFamily="34" charset="0"/>
-              <a:buChar char="•"/>
-              <a:defRPr sz="6307" kern="1200">
-                <a:solidFill>
-                  <a:schemeClr val="tx1"/>
-                </a:solidFill>
-                <a:latin typeface="+mn-lt"/>
-                <a:ea typeface="+mn-ea"/>
-                <a:cs typeface="+mn-cs"/>
-              </a:defRPr>
-            </a:lvl6pPr>
-            <a:lvl7pPr marL="11620654" indent="-893897" algn="l" defTabSz="3575587" rtl="0" eaLnBrk="1" latinLnBrk="0" hangingPunct="1">
-              <a:spcBef>
-                <a:spcPct val="20000"/>
-              </a:spcBef>
-              <a:buFont typeface="Arial" pitchFamily="34" charset="0"/>
-              <a:buChar char="•"/>
-              <a:defRPr sz="6307" kern="1200">
-                <a:solidFill>
-                  <a:schemeClr val="tx1"/>
-                </a:solidFill>
-                <a:latin typeface="+mn-lt"/>
-                <a:ea typeface="+mn-ea"/>
-                <a:cs typeface="+mn-cs"/>
-              </a:defRPr>
-            </a:lvl7pPr>
-            <a:lvl8pPr marL="13408451" indent="-893897" algn="l" defTabSz="3575587" rtl="0" eaLnBrk="1" latinLnBrk="0" hangingPunct="1">
-              <a:spcBef>
-                <a:spcPct val="20000"/>
-              </a:spcBef>
-              <a:buFont typeface="Arial" pitchFamily="34" charset="0"/>
-              <a:buChar char="•"/>
-              <a:defRPr sz="6307" kern="1200">
-                <a:solidFill>
-                  <a:schemeClr val="tx1"/>
-                </a:solidFill>
-                <a:latin typeface="+mn-lt"/>
-                <a:ea typeface="+mn-ea"/>
-                <a:cs typeface="+mn-cs"/>
-              </a:defRPr>
-            </a:lvl8pPr>
-            <a:lvl9pPr marL="15196244" indent="-893897" algn="l" defTabSz="3575587" rtl="0" eaLnBrk="1" latinLnBrk="0" hangingPunct="1">
-              <a:spcBef>
-                <a:spcPct val="20000"/>
-              </a:spcBef>
-              <a:buFont typeface="Arial" pitchFamily="34" charset="0"/>
-              <a:buChar char="•"/>
-              <a:defRPr sz="6307" kern="1200">
-                <a:solidFill>
-                  <a:schemeClr val="tx1"/>
-                </a:solidFill>
-                <a:latin typeface="+mn-lt"/>
-                <a:ea typeface="+mn-ea"/>
-                <a:cs typeface="+mn-cs"/>
-              </a:defRPr>
-            </a:lvl9pPr>
-          </a:lstStyle>
-          <a:p>
-            <a:pPr marL="0" indent="0" defTabSz="3574551" eaLnBrk="1" hangingPunct="1">
-              <a:spcBef>
-                <a:spcPts val="0"/>
-              </a:spcBef>
-              <a:spcAft>
-                <a:spcPts val="0"/>
-              </a:spcAft>
-              <a:buFont typeface="Arial" charset="0"/>
-              <a:buNone/>
-              <a:defRPr/>
-            </a:pPr>
-            <a:r>
-              <a:rPr lang="en-US" sz="3200" dirty="0">
-                <a:cs typeface="Arial" pitchFamily="34" charset="0"/>
-              </a:rPr>
-              <a:t>This model has been applied successfully on the Italian dataset [3]. Our formulation of the model and results are consistent with their findings.</a:t>
-            </a:r>
-          </a:p>
-        </p:txBody>
-      </p:sp>
-      <p:pic>
-        <p:nvPicPr>
-          <p:cNvPr id="35" name="Picture 34" descr="Chart, line chart&#10;&#10;Description automatically generated">
-            <a:extLst>
-              <a:ext uri="{FF2B5EF4-FFF2-40B4-BE49-F238E27FC236}">
-                <a16:creationId xmlns:a16="http://schemas.microsoft.com/office/drawing/2014/main" id="{71E5CCA2-88A1-413A-812A-3D05FC7F90AD}"/>
-              </a:ext>
-            </a:extLst>
-          </p:cNvPr>
-          <p:cNvPicPr>
-            <a:picLocks noChangeAspect="1"/>
-          </p:cNvPicPr>
-          <p:nvPr/>
-        </p:nvPicPr>
-        <p:blipFill rotWithShape="1">
-          <a:blip r:embed="rId23" cstate="print">
-            <a:extLst>
-              <a:ext uri="{28A0092B-C50C-407E-A947-70E740481C1C}">
-                <a14:useLocalDpi xmlns:a14="http://schemas.microsoft.com/office/drawing/2010/main" val="0"/>
-              </a:ext>
-            </a:extLst>
-          </a:blip>
-          <a:srcRect l="12717" r="10674" b="11531"/>
-          <a:stretch/>
-        </p:blipFill>
-        <p:spPr>
-          <a:xfrm>
-            <a:off x="39207826" y="6133460"/>
-            <a:ext cx="3574424" cy="2045036"/>
-          </a:xfrm>
-          <a:prstGeom prst="rect">
-            <a:avLst/>
-          </a:prstGeom>
-          <a:solidFill>
-            <a:srgbClr val="FFFFFF">
-              <a:shade val="85000"/>
-            </a:srgbClr>
-          </a:solidFill>
-          <a:ln w="190500" cap="rnd">
-            <a:solidFill>
-              <a:srgbClr val="FFFFFF"/>
-            </a:solidFill>
-          </a:ln>
-          <a:effectLst>
-            <a:outerShdw blurRad="50000" algn="tl" rotWithShape="0">
-              <a:srgbClr val="000000">
-                <a:alpha val="41000"/>
-              </a:srgbClr>
-            </a:outerShdw>
-          </a:effectLst>
-          <a:scene3d>
-            <a:camera prst="orthographicFront"/>
-            <a:lightRig rig="twoPt" dir="t">
-              <a:rot lat="0" lon="0" rev="7800000"/>
-            </a:lightRig>
-          </a:scene3d>
-          <a:sp3d contourW="6350">
-            <a:bevelT w="50800" h="16510"/>
-            <a:contourClr>
-              <a:srgbClr val="C0C0C0"/>
-            </a:contourClr>
-          </a:sp3d>
-        </p:spPr>
-      </p:pic>
-      <p:pic>
-        <p:nvPicPr>
-          <p:cNvPr id="37" name="Picture 36" descr="Chart, line chart&#10;&#10;Description automatically generated">
-            <a:extLst>
-              <a:ext uri="{FF2B5EF4-FFF2-40B4-BE49-F238E27FC236}">
-                <a16:creationId xmlns:a16="http://schemas.microsoft.com/office/drawing/2014/main" id="{FC353CF9-19D4-4579-BCCF-C008AFA62E91}"/>
-              </a:ext>
-            </a:extLst>
-          </p:cNvPr>
-          <p:cNvPicPr>
-            <a:picLocks noChangeAspect="1"/>
-          </p:cNvPicPr>
-          <p:nvPr/>
-        </p:nvPicPr>
-        <p:blipFill rotWithShape="1">
-          <a:blip r:embed="rId24" cstate="print">
-            <a:extLst>
-              <a:ext uri="{28A0092B-C50C-407E-A947-70E740481C1C}">
-                <a14:useLocalDpi xmlns:a14="http://schemas.microsoft.com/office/drawing/2010/main" val="0"/>
-              </a:ext>
-            </a:extLst>
-          </a:blip>
-          <a:srcRect l="14004" r="12656" b="12012"/>
-          <a:stretch/>
-        </p:blipFill>
-        <p:spPr>
-          <a:xfrm>
-            <a:off x="29496655" y="6122335"/>
-            <a:ext cx="3421851" cy="2033919"/>
-          </a:xfrm>
-          <a:prstGeom prst="rect">
-            <a:avLst/>
-          </a:prstGeom>
-          <a:solidFill>
-            <a:srgbClr val="FFFFFF">
-              <a:shade val="85000"/>
-            </a:srgbClr>
-          </a:solidFill>
-          <a:ln w="190500" cap="rnd">
-            <a:solidFill>
-              <a:srgbClr val="FFFFFF"/>
-            </a:solidFill>
-          </a:ln>
-          <a:effectLst>
-            <a:outerShdw blurRad="50000" algn="tl" rotWithShape="0">
-              <a:srgbClr val="000000">
-                <a:alpha val="41000"/>
-              </a:srgbClr>
-            </a:outerShdw>
-          </a:effectLst>
-          <a:scene3d>
-            <a:camera prst="orthographicFront"/>
-            <a:lightRig rig="twoPt" dir="t">
-              <a:rot lat="0" lon="0" rev="7800000"/>
-            </a:lightRig>
-          </a:scene3d>
-          <a:sp3d contourW="6350">
-            <a:bevelT w="50800" h="16510"/>
-            <a:contourClr>
-              <a:srgbClr val="C0C0C0"/>
-            </a:contourClr>
-          </a:sp3d>
-        </p:spPr>
-      </p:pic>
       <p:pic>
         <p:nvPicPr>
           <p:cNvPr id="52" name="Picture 51" descr="Chart, histogram&#10;&#10;Description automatically generated">
@@ -12294,7 +10575,7 @@
           <p:nvPr/>
         </p:nvPicPr>
         <p:blipFill rotWithShape="1">
-          <a:blip r:embed="rId25">
+          <a:blip r:embed="rId19">
             <a:extLst>
               <a:ext uri="{28A0092B-C50C-407E-A947-70E740481C1C}">
                 <a14:useLocalDpi xmlns:a14="http://schemas.microsoft.com/office/drawing/2010/main" val="0"/>
@@ -12306,49 +10587,1588 @@
         </p:blipFill>
         <p:spPr>
           <a:xfrm>
-            <a:off x="22049822" y="10547508"/>
-            <a:ext cx="7148485" cy="4093692"/>
+            <a:off x="21785019" y="10547508"/>
+            <a:ext cx="6865996" cy="3931920"/>
           </a:xfrm>
           <a:prstGeom prst="rect">
             <a:avLst/>
           </a:prstGeom>
         </p:spPr>
       </p:pic>
-      <p:pic>
-        <p:nvPicPr>
-          <p:cNvPr id="63" name="Picture 62" descr="Chart, histogram&#10;&#10;Description automatically generated">
-            <a:extLst>
-              <a:ext uri="{FF2B5EF4-FFF2-40B4-BE49-F238E27FC236}">
-                <a16:creationId xmlns:a16="http://schemas.microsoft.com/office/drawing/2014/main" id="{B345EF60-C432-4438-87CE-2E7190CC0187}"/>
-              </a:ext>
-            </a:extLst>
-          </p:cNvPr>
-          <p:cNvPicPr>
-            <a:picLocks noChangeAspect="1"/>
-          </p:cNvPicPr>
+      <p:sp>
+        <p:nvSpPr>
+          <p:cNvPr id="88" name="Rectangle 87"/>
+          <p:cNvSpPr/>
           <p:nvPr/>
-        </p:nvPicPr>
-        <p:blipFill rotWithShape="1">
-          <a:blip r:embed="rId26">
-            <a:extLst>
-              <a:ext uri="{28A0092B-C50C-407E-A947-70E740481C1C}">
-                <a14:useLocalDpi xmlns:a14="http://schemas.microsoft.com/office/drawing/2010/main" val="0"/>
-              </a:ext>
-            </a:extLst>
-          </a:blip>
-          <a:srcRect l="4077" r="9359"/>
-          <a:stretch/>
-        </p:blipFill>
+        </p:nvSpPr>
         <p:spPr>
           <a:xfrm>
-            <a:off x="21537232" y="28098370"/>
-            <a:ext cx="8173664" cy="4678092"/>
+            <a:off x="497043" y="5660652"/>
+            <a:ext cx="13627351" cy="6001643"/>
           </a:xfrm>
           <a:prstGeom prst="rect">
             <a:avLst/>
           </a:prstGeom>
         </p:spPr>
-      </p:pic>
+        <p:txBody>
+          <a:bodyPr wrap="square">
+            <a:spAutoFit/>
+          </a:bodyPr>
+          <a:lstStyle/>
+          <a:p>
+            <a:pPr lvl="0" defTabSz="3574551">
+              <a:spcBef>
+                <a:spcPts val="0"/>
+              </a:spcBef>
+              <a:spcAft>
+                <a:spcPts val="1800"/>
+              </a:spcAft>
+              <a:defRPr/>
+            </a:pPr>
+            <a:r>
+              <a:rPr lang="en-US" sz="3200" dirty="0">
+                <a:solidFill>
+                  <a:prstClr val="black"/>
+                </a:solidFill>
+                <a:latin typeface="+mn-lt"/>
+                <a:cs typeface="Arial" pitchFamily="34" charset="0"/>
+              </a:rPr>
+              <a:t>The COVID-19 global pandemic has highlighted the importance of identifying effective ways to control the spread of an infectious disease in a population. A solid understanding of the dynamics and the underlying mechanisms that govern this spread is an important step toward such a goal. Susceptible-Infected-Recovered (SIR) models and their variants have played an important role in providing such insight. However, these models have limited explanatory and predictive power due to policy and behavior changes over time. Here we present a modified version of the standard SIR models by introducing feedback in the disease transmission rate. We apply this model to publicly available COVID-19 US and international infection data. We show this model is more robust to parameter variations due to public health interventions and has much better explanatory and predictive power</a:t>
+            </a:r>
+          </a:p>
+        </p:txBody>
+      </p:sp>
+      <p:sp>
+        <p:nvSpPr>
+          <p:cNvPr id="90" name="Rectangle 89"/>
+          <p:cNvSpPr/>
+          <p:nvPr/>
+        </p:nvSpPr>
+        <p:spPr>
+          <a:xfrm>
+            <a:off x="497043" y="26213574"/>
+            <a:ext cx="13627351" cy="1077218"/>
+          </a:xfrm>
+          <a:prstGeom prst="rect">
+            <a:avLst/>
+          </a:prstGeom>
+        </p:spPr>
+        <p:txBody>
+          <a:bodyPr wrap="square">
+            <a:spAutoFit/>
+          </a:bodyPr>
+          <a:lstStyle/>
+          <a:p>
+            <a:pPr lvl="0" defTabSz="3574551">
+              <a:spcBef>
+                <a:spcPts val="0"/>
+              </a:spcBef>
+              <a:spcAft>
+                <a:spcPts val="1800"/>
+              </a:spcAft>
+              <a:defRPr/>
+            </a:pPr>
+            <a:r>
+              <a:rPr lang="en-US" sz="3200" dirty="0">
+                <a:solidFill>
+                  <a:prstClr val="black"/>
+                </a:solidFill>
+                <a:latin typeface="+mn-lt"/>
+                <a:cs typeface="Arial" pitchFamily="34" charset="0"/>
+              </a:rPr>
+              <a:t>This model has been applied successfully on the Italian dataset [3]. Our model and results are consistent with these previous findings.</a:t>
+            </a:r>
+          </a:p>
+        </p:txBody>
+      </p:sp>
+      <p:sp>
+        <p:nvSpPr>
+          <p:cNvPr id="91" name="Rectangle 90"/>
+          <p:cNvSpPr/>
+          <p:nvPr/>
+        </p:nvSpPr>
+        <p:spPr>
+          <a:xfrm>
+            <a:off x="399946" y="28825928"/>
+            <a:ext cx="8663882" cy="2062103"/>
+          </a:xfrm>
+          <a:prstGeom prst="rect">
+            <a:avLst/>
+          </a:prstGeom>
+        </p:spPr>
+        <p:txBody>
+          <a:bodyPr wrap="square">
+            <a:spAutoFit/>
+          </a:bodyPr>
+          <a:lstStyle/>
+          <a:p>
+            <a:pPr lvl="0" defTabSz="3574551">
+              <a:spcBef>
+                <a:spcPts val="0"/>
+              </a:spcBef>
+              <a:spcAft>
+                <a:spcPts val="1800"/>
+              </a:spcAft>
+              <a:defRPr/>
+            </a:pPr>
+            <a:r>
+              <a:rPr lang="en-US" sz="3200" dirty="0">
+                <a:solidFill>
+                  <a:prstClr val="black"/>
+                </a:solidFill>
+                <a:latin typeface="+mn-lt"/>
+                <a:cs typeface="Arial" pitchFamily="34" charset="0"/>
+              </a:rPr>
+              <a:t>The transmission rate is replaced by a time varying beta based on the number of current infections after some delay </a:t>
+            </a:r>
+            <a:r>
+              <a:rPr lang="en-US" sz="3200" dirty="0">
+                <a:solidFill>
+                  <a:prstClr val="black"/>
+                </a:solidFill>
+                <a:latin typeface="Symbol" panose="05050102010706020507" pitchFamily="18" charset="2"/>
+                <a:cs typeface="Arial" pitchFamily="34" charset="0"/>
+              </a:rPr>
+              <a:t>d</a:t>
+            </a:r>
+            <a:r>
+              <a:rPr lang="en-US" sz="3200" dirty="0">
+                <a:solidFill>
+                  <a:prstClr val="black"/>
+                </a:solidFill>
+                <a:latin typeface="+mn-lt"/>
+                <a:cs typeface="Arial" pitchFamily="34" charset="0"/>
+              </a:rPr>
+              <a:t> (normally </a:t>
+            </a:r>
+            <a:r>
+              <a:rPr lang="en-US" sz="3200" dirty="0">
+                <a:solidFill>
+                  <a:prstClr val="black"/>
+                </a:solidFill>
+                <a:latin typeface="Symbol" panose="05050102010706020507" pitchFamily="18" charset="2"/>
+                <a:cs typeface="Arial" pitchFamily="34" charset="0"/>
+              </a:rPr>
+              <a:t>d</a:t>
+            </a:r>
+            <a:r>
+              <a:rPr lang="en-US" sz="3200" dirty="0">
+                <a:solidFill>
+                  <a:prstClr val="black"/>
+                </a:solidFill>
+                <a:latin typeface="+mn-lt"/>
+                <a:cs typeface="Arial" pitchFamily="34" charset="0"/>
+              </a:rPr>
+              <a:t>=14). The nonlinear variables are solved by gridding and are positive.</a:t>
+            </a:r>
+          </a:p>
+        </p:txBody>
+      </p:sp>
+      <p:grpSp>
+        <p:nvGrpSpPr>
+          <p:cNvPr id="5" name="Group 4"/>
+          <p:cNvGrpSpPr/>
+          <p:nvPr/>
+        </p:nvGrpSpPr>
+        <p:grpSpPr>
+          <a:xfrm>
+            <a:off x="14448096" y="23679526"/>
+            <a:ext cx="15116074" cy="8476874"/>
+            <a:chOff x="14317988" y="23392968"/>
+            <a:chExt cx="15540116" cy="8476874"/>
+          </a:xfrm>
+        </p:grpSpPr>
+        <p:pic>
+          <p:nvPicPr>
+            <p:cNvPr id="63" name="Picture 62" descr="Chart, histogram&#10;&#10;Description automatically generated">
+              <a:extLst>
+                <a:ext uri="{FF2B5EF4-FFF2-40B4-BE49-F238E27FC236}">
+                  <a16:creationId xmlns:a16="http://schemas.microsoft.com/office/drawing/2014/main" id="{B345EF60-C432-4438-87CE-2E7190CC0187}"/>
+                </a:ext>
+              </a:extLst>
+            </p:cNvPr>
+            <p:cNvPicPr>
+              <a:picLocks noChangeAspect="1"/>
+            </p:cNvPicPr>
+            <p:nvPr/>
+          </p:nvPicPr>
+          <p:blipFill rotWithShape="1">
+            <a:blip r:embed="rId20">
+              <a:extLst>
+                <a:ext uri="{28A0092B-C50C-407E-A947-70E740481C1C}">
+                  <a14:useLocalDpi xmlns:a14="http://schemas.microsoft.com/office/drawing/2010/main" val="0"/>
+                </a:ext>
+              </a:extLst>
+            </a:blip>
+            <a:srcRect l="4077" r="9359"/>
+            <a:stretch/>
+          </p:blipFill>
+          <p:spPr>
+            <a:xfrm>
+              <a:off x="21564600" y="27663602"/>
+              <a:ext cx="7571232" cy="4206240"/>
+            </a:xfrm>
+            <a:prstGeom prst="rect">
+              <a:avLst/>
+            </a:prstGeom>
+          </p:spPr>
+        </p:pic>
+        <p:pic>
+          <p:nvPicPr>
+            <p:cNvPr id="125" name="Picture 124" descr="Chart, histogram&#10;&#10;Description automatically generated">
+              <a:extLst>
+                <a:ext uri="{FF2B5EF4-FFF2-40B4-BE49-F238E27FC236}">
+                  <a16:creationId xmlns:a16="http://schemas.microsoft.com/office/drawing/2014/main" id="{8DAE1EF0-CC5A-40D8-AD49-0E4E489D66BC}"/>
+                </a:ext>
+              </a:extLst>
+            </p:cNvPr>
+            <p:cNvPicPr>
+              <a:picLocks noChangeAspect="1"/>
+            </p:cNvPicPr>
+            <p:nvPr/>
+          </p:nvPicPr>
+          <p:blipFill rotWithShape="1">
+            <a:blip r:embed="rId21">
+              <a:extLst>
+                <a:ext uri="{28A0092B-C50C-407E-A947-70E740481C1C}">
+                  <a14:useLocalDpi xmlns:a14="http://schemas.microsoft.com/office/drawing/2010/main" val="0"/>
+                </a:ext>
+              </a:extLst>
+            </a:blip>
+            <a:srcRect l="4620"/>
+            <a:stretch/>
+          </p:blipFill>
+          <p:spPr>
+            <a:xfrm>
+              <a:off x="21618070" y="23392968"/>
+              <a:ext cx="8240034" cy="4206240"/>
+            </a:xfrm>
+            <a:prstGeom prst="rect">
+              <a:avLst/>
+            </a:prstGeom>
+          </p:spPr>
+        </p:pic>
+        <p:pic>
+          <p:nvPicPr>
+            <p:cNvPr id="126" name="Picture 125" descr="Chart, line chart&#10;&#10;Description automatically generated">
+              <a:extLst>
+                <a:ext uri="{FF2B5EF4-FFF2-40B4-BE49-F238E27FC236}">
+                  <a16:creationId xmlns:a16="http://schemas.microsoft.com/office/drawing/2014/main" id="{4E0AF005-610F-4823-A87B-FC76F0859D76}"/>
+                </a:ext>
+              </a:extLst>
+            </p:cNvPr>
+            <p:cNvPicPr>
+              <a:picLocks noChangeAspect="1"/>
+            </p:cNvPicPr>
+            <p:nvPr/>
+          </p:nvPicPr>
+          <p:blipFill rotWithShape="1">
+            <a:blip r:embed="rId22">
+              <a:extLst>
+                <a:ext uri="{28A0092B-C50C-407E-A947-70E740481C1C}">
+                  <a14:useLocalDpi xmlns:a14="http://schemas.microsoft.com/office/drawing/2010/main" val="0"/>
+                </a:ext>
+              </a:extLst>
+            </a:blip>
+            <a:srcRect r="8824"/>
+            <a:stretch/>
+          </p:blipFill>
+          <p:spPr>
+            <a:xfrm>
+              <a:off x="14374368" y="27599208"/>
+              <a:ext cx="7571232" cy="4206240"/>
+            </a:xfrm>
+            <a:prstGeom prst="rect">
+              <a:avLst/>
+            </a:prstGeom>
+          </p:spPr>
+        </p:pic>
+        <p:pic>
+          <p:nvPicPr>
+            <p:cNvPr id="97" name="Picture 96" descr="Chart, line chart&#10;&#10;Description automatically generated">
+              <a:extLst>
+                <a:ext uri="{FF2B5EF4-FFF2-40B4-BE49-F238E27FC236}">
+                  <a16:creationId xmlns:a16="http://schemas.microsoft.com/office/drawing/2014/main" id="{352E4D97-7B2D-40C9-9552-5CB34B5372D2}"/>
+                </a:ext>
+              </a:extLst>
+            </p:cNvPr>
+            <p:cNvPicPr>
+              <a:picLocks noChangeAspect="1"/>
+            </p:cNvPicPr>
+            <p:nvPr/>
+          </p:nvPicPr>
+          <p:blipFill rotWithShape="1">
+            <a:blip r:embed="rId23">
+              <a:extLst>
+                <a:ext uri="{28A0092B-C50C-407E-A947-70E740481C1C}">
+                  <a14:useLocalDpi xmlns:a14="http://schemas.microsoft.com/office/drawing/2010/main" val="0"/>
+                </a:ext>
+              </a:extLst>
+            </a:blip>
+            <a:srcRect r="8824"/>
+            <a:stretch/>
+          </p:blipFill>
+          <p:spPr>
+            <a:xfrm>
+              <a:off x="14317988" y="23392968"/>
+              <a:ext cx="7571232" cy="4206240"/>
+            </a:xfrm>
+            <a:prstGeom prst="rect">
+              <a:avLst/>
+            </a:prstGeom>
+          </p:spPr>
+        </p:pic>
+      </p:grpSp>
+      <p:sp>
+        <p:nvSpPr>
+          <p:cNvPr id="131" name="Rectangle 130">
+            <a:extLst>
+              <a:ext uri="{FF2B5EF4-FFF2-40B4-BE49-F238E27FC236}">
+                <a16:creationId xmlns:a16="http://schemas.microsoft.com/office/drawing/2014/main" id="{E5D6D713-E6E3-45F1-9C73-5FD9A4B8B6DA}"/>
+              </a:ext>
+            </a:extLst>
+          </p:cNvPr>
+          <p:cNvSpPr/>
+          <p:nvPr/>
+        </p:nvSpPr>
+        <p:spPr>
+          <a:xfrm>
+            <a:off x="14971469" y="14910072"/>
+            <a:ext cx="13627350" cy="1569660"/>
+          </a:xfrm>
+          <a:prstGeom prst="rect">
+            <a:avLst/>
+          </a:prstGeom>
+        </p:spPr>
+        <p:txBody>
+          <a:bodyPr wrap="square">
+            <a:spAutoFit/>
+          </a:bodyPr>
+          <a:lstStyle/>
+          <a:p>
+            <a:pPr lvl="0" defTabSz="3574551">
+              <a:spcBef>
+                <a:spcPts val="0"/>
+              </a:spcBef>
+              <a:spcAft>
+                <a:spcPts val="1800"/>
+              </a:spcAft>
+              <a:defRPr/>
+            </a:pPr>
+            <a:r>
+              <a:rPr lang="en-US" sz="3200" dirty="0">
+                <a:solidFill>
+                  <a:prstClr val="black"/>
+                </a:solidFill>
+                <a:latin typeface="Calibri"/>
+                <a:cs typeface="Arial" pitchFamily="34" charset="0"/>
+              </a:rPr>
+              <a:t>The feedback SIRD model can better track the disease transmission rate thus providing a better snapshot of the efficacy of public health measures and public behavior. </a:t>
+            </a:r>
+          </a:p>
+        </p:txBody>
+      </p:sp>
+      <p:grpSp>
+        <p:nvGrpSpPr>
+          <p:cNvPr id="2" name="Group 1">
+            <a:extLst>
+              <a:ext uri="{FF2B5EF4-FFF2-40B4-BE49-F238E27FC236}">
+                <a16:creationId xmlns:a16="http://schemas.microsoft.com/office/drawing/2014/main" id="{BB50B948-5E44-4718-995A-38DB27EF0BA3}"/>
+              </a:ext>
+            </a:extLst>
+          </p:cNvPr>
+          <p:cNvGrpSpPr/>
+          <p:nvPr/>
+        </p:nvGrpSpPr>
+        <p:grpSpPr>
+          <a:xfrm>
+            <a:off x="30112508" y="5375708"/>
+            <a:ext cx="12983650" cy="3587266"/>
+            <a:chOff x="29690574" y="5372733"/>
+            <a:chExt cx="12983650" cy="3587266"/>
+          </a:xfrm>
+        </p:grpSpPr>
+        <p:pic>
+          <p:nvPicPr>
+            <p:cNvPr id="35" name="Picture 34" descr="Chart, line chart&#10;&#10;Description automatically generated">
+              <a:extLst>
+                <a:ext uri="{FF2B5EF4-FFF2-40B4-BE49-F238E27FC236}">
+                  <a16:creationId xmlns:a16="http://schemas.microsoft.com/office/drawing/2014/main" id="{71E5CCA2-88A1-413A-812A-3D05FC7F90AD}"/>
+                </a:ext>
+              </a:extLst>
+            </p:cNvPr>
+            <p:cNvPicPr>
+              <a:picLocks noChangeAspect="1"/>
+            </p:cNvPicPr>
+            <p:nvPr/>
+          </p:nvPicPr>
+          <p:blipFill rotWithShape="1">
+            <a:blip r:embed="rId24" cstate="print">
+              <a:extLst>
+                <a:ext uri="{28A0092B-C50C-407E-A947-70E740481C1C}">
+                  <a14:useLocalDpi xmlns:a14="http://schemas.microsoft.com/office/drawing/2010/main" val="0"/>
+                </a:ext>
+              </a:extLst>
+            </a:blip>
+            <a:srcRect l="12717" t="9356" r="11488" b="8233"/>
+            <a:stretch/>
+          </p:blipFill>
+          <p:spPr>
+            <a:xfrm>
+              <a:off x="39127625" y="6138353"/>
+              <a:ext cx="3546599" cy="2061976"/>
+            </a:xfrm>
+            <a:prstGeom prst="rect">
+              <a:avLst/>
+            </a:prstGeom>
+            <a:solidFill>
+              <a:srgbClr val="FFFFFF">
+                <a:shade val="85000"/>
+              </a:srgbClr>
+            </a:solidFill>
+            <a:ln w="190500" cap="rnd">
+              <a:solidFill>
+                <a:srgbClr val="FFFFFF"/>
+              </a:solidFill>
+            </a:ln>
+            <a:effectLst>
+              <a:outerShdw blurRad="50000" algn="tl" rotWithShape="0">
+                <a:srgbClr val="000000">
+                  <a:alpha val="41000"/>
+                </a:srgbClr>
+              </a:outerShdw>
+            </a:effectLst>
+            <a:scene3d>
+              <a:camera prst="orthographicFront"/>
+              <a:lightRig rig="twoPt" dir="t">
+                <a:rot lat="0" lon="0" rev="7800000"/>
+              </a:lightRig>
+            </a:scene3d>
+            <a:sp3d contourW="6350">
+              <a:bevelT w="50800" h="16510"/>
+              <a:contourClr>
+                <a:srgbClr val="C0C0C0"/>
+              </a:contourClr>
+            </a:sp3d>
+          </p:spPr>
+        </p:pic>
+        <p:pic>
+          <p:nvPicPr>
+            <p:cNvPr id="37" name="Picture 36" descr="Chart, line chart&#10;&#10;Description automatically generated">
+              <a:extLst>
+                <a:ext uri="{FF2B5EF4-FFF2-40B4-BE49-F238E27FC236}">
+                  <a16:creationId xmlns:a16="http://schemas.microsoft.com/office/drawing/2014/main" id="{FC353CF9-19D4-4579-BCCF-C008AFA62E91}"/>
+                </a:ext>
+              </a:extLst>
+            </p:cNvPr>
+            <p:cNvPicPr>
+              <a:picLocks noChangeAspect="1"/>
+            </p:cNvPicPr>
+            <p:nvPr/>
+          </p:nvPicPr>
+          <p:blipFill rotWithShape="1">
+            <a:blip r:embed="rId25" cstate="print">
+              <a:extLst>
+                <a:ext uri="{28A0092B-C50C-407E-A947-70E740481C1C}">
+                  <a14:useLocalDpi xmlns:a14="http://schemas.microsoft.com/office/drawing/2010/main" val="0"/>
+                </a:ext>
+              </a:extLst>
+            </a:blip>
+            <a:srcRect l="14004" t="13115" r="12656" b="8202"/>
+            <a:stretch/>
+          </p:blipFill>
+          <p:spPr>
+            <a:xfrm>
+              <a:off x="29690574" y="6170727"/>
+              <a:ext cx="3526892" cy="2011680"/>
+            </a:xfrm>
+            <a:prstGeom prst="rect">
+              <a:avLst/>
+            </a:prstGeom>
+            <a:solidFill>
+              <a:srgbClr val="FFFFFF">
+                <a:shade val="85000"/>
+              </a:srgbClr>
+            </a:solidFill>
+            <a:ln w="190500" cap="rnd">
+              <a:solidFill>
+                <a:srgbClr val="FFFFFF"/>
+              </a:solidFill>
+            </a:ln>
+            <a:effectLst>
+              <a:outerShdw blurRad="50000" algn="tl" rotWithShape="0">
+                <a:srgbClr val="000000">
+                  <a:alpha val="41000"/>
+                </a:srgbClr>
+              </a:outerShdw>
+            </a:effectLst>
+            <a:scene3d>
+              <a:camera prst="orthographicFront"/>
+              <a:lightRig rig="twoPt" dir="t">
+                <a:rot lat="0" lon="0" rev="7800000"/>
+              </a:lightRig>
+            </a:scene3d>
+            <a:sp3d contourW="6350">
+              <a:bevelT w="50800" h="16510"/>
+              <a:contourClr>
+                <a:srgbClr val="C0C0C0"/>
+              </a:contourClr>
+            </a:sp3d>
+          </p:spPr>
+        </p:pic>
+        <p:grpSp>
+          <p:nvGrpSpPr>
+            <p:cNvPr id="175" name="Group 174">
+              <a:extLst>
+                <a:ext uri="{FF2B5EF4-FFF2-40B4-BE49-F238E27FC236}">
+                  <a16:creationId xmlns:a16="http://schemas.microsoft.com/office/drawing/2014/main" id="{67082DAC-D268-4D76-9C40-49FDAFC881E0}"/>
+                </a:ext>
+              </a:extLst>
+            </p:cNvPr>
+            <p:cNvGrpSpPr/>
+            <p:nvPr/>
+          </p:nvGrpSpPr>
+          <p:grpSpPr>
+            <a:xfrm>
+              <a:off x="33412472" y="5372733"/>
+              <a:ext cx="5601928" cy="3533125"/>
+              <a:chOff x="4117761" y="1828800"/>
+              <a:chExt cx="3768208" cy="2275367"/>
+            </a:xfrm>
+          </p:grpSpPr>
+          <p:sp>
+            <p:nvSpPr>
+              <p:cNvPr id="176" name="Rounded Rectangle 5">
+                <a:extLst>
+                  <a:ext uri="{FF2B5EF4-FFF2-40B4-BE49-F238E27FC236}">
+                    <a16:creationId xmlns:a16="http://schemas.microsoft.com/office/drawing/2014/main" id="{CD904160-A1A4-42C9-83F6-1F57B371C8E3}"/>
+                  </a:ext>
+                </a:extLst>
+              </p:cNvPr>
+              <p:cNvSpPr/>
+              <p:nvPr/>
+            </p:nvSpPr>
+            <p:spPr>
+              <a:xfrm>
+                <a:off x="4499260" y="1828800"/>
+                <a:ext cx="2874036" cy="2275367"/>
+              </a:xfrm>
+              <a:prstGeom prst="roundRect">
+                <a:avLst/>
+              </a:prstGeom>
+              <a:solidFill>
+                <a:schemeClr val="bg1">
+                  <a:lumMod val="85000"/>
+                </a:schemeClr>
+              </a:solidFill>
+            </p:spPr>
+            <p:style>
+              <a:lnRef idx="2">
+                <a:schemeClr val="accent1">
+                  <a:shade val="50000"/>
+                </a:schemeClr>
+              </a:lnRef>
+              <a:fillRef idx="1">
+                <a:schemeClr val="accent1"/>
+              </a:fillRef>
+              <a:effectRef idx="0">
+                <a:schemeClr val="accent1"/>
+              </a:effectRef>
+              <a:fontRef idx="minor">
+                <a:schemeClr val="lt1"/>
+              </a:fontRef>
+            </p:style>
+            <p:txBody>
+              <a:bodyPr rtlCol="0" anchor="ctr"/>
+              <a:lstStyle/>
+              <a:p>
+                <a:pPr algn="ctr"/>
+                <a:endParaRPr lang="en-US"/>
+              </a:p>
+            </p:txBody>
+          </p:sp>
+          <p:sp>
+            <p:nvSpPr>
+              <p:cNvPr id="178" name="Right Arrow 7">
+                <a:extLst>
+                  <a:ext uri="{FF2B5EF4-FFF2-40B4-BE49-F238E27FC236}">
+                    <a16:creationId xmlns:a16="http://schemas.microsoft.com/office/drawing/2014/main" id="{BCAE91B1-30BE-4107-8E41-5A4B583807CD}"/>
+                  </a:ext>
+                </a:extLst>
+              </p:cNvPr>
+              <p:cNvSpPr/>
+              <p:nvPr/>
+            </p:nvSpPr>
+            <p:spPr>
+              <a:xfrm>
+                <a:off x="4117761" y="2679405"/>
+                <a:ext cx="354923" cy="597909"/>
+              </a:xfrm>
+              <a:prstGeom prst="rightArrow">
+                <a:avLst/>
+              </a:prstGeom>
+            </p:spPr>
+            <p:style>
+              <a:lnRef idx="2">
+                <a:schemeClr val="accent1">
+                  <a:shade val="50000"/>
+                </a:schemeClr>
+              </a:lnRef>
+              <a:fillRef idx="1">
+                <a:schemeClr val="accent1"/>
+              </a:fillRef>
+              <a:effectRef idx="0">
+                <a:schemeClr val="accent1"/>
+              </a:effectRef>
+              <a:fontRef idx="minor">
+                <a:schemeClr val="lt1"/>
+              </a:fontRef>
+            </p:style>
+            <p:txBody>
+              <a:bodyPr rtlCol="0" anchor="ctr"/>
+              <a:lstStyle/>
+              <a:p>
+                <a:pPr algn="ctr"/>
+                <a:endParaRPr lang="en-US"/>
+              </a:p>
+            </p:txBody>
+          </p:sp>
+          <p:grpSp>
+            <p:nvGrpSpPr>
+              <p:cNvPr id="181" name="Group 180">
+                <a:extLst>
+                  <a:ext uri="{FF2B5EF4-FFF2-40B4-BE49-F238E27FC236}">
+                    <a16:creationId xmlns:a16="http://schemas.microsoft.com/office/drawing/2014/main" id="{6A101AC9-2A10-47C1-8C25-8B97F96746B5}"/>
+                  </a:ext>
+                </a:extLst>
+              </p:cNvPr>
+              <p:cNvGrpSpPr/>
+              <p:nvPr/>
+            </p:nvGrpSpPr>
+            <p:grpSpPr>
+              <a:xfrm>
+                <a:off x="4693982" y="1958109"/>
+                <a:ext cx="3191987" cy="2001492"/>
+                <a:chOff x="1005256" y="15678897"/>
+                <a:chExt cx="4838050" cy="3508907"/>
+              </a:xfrm>
+            </p:grpSpPr>
+            <mc:AlternateContent xmlns:mc="http://schemas.openxmlformats.org/markup-compatibility/2006" xmlns:a14="http://schemas.microsoft.com/office/drawing/2010/main">
+              <mc:Choice Requires="a14">
+                <p:sp>
+                  <p:nvSpPr>
+                    <p:cNvPr id="184" name="TextBox 183">
+                      <a:extLst>
+                        <a:ext uri="{FF2B5EF4-FFF2-40B4-BE49-F238E27FC236}">
+                          <a16:creationId xmlns:a16="http://schemas.microsoft.com/office/drawing/2014/main" id="{64F74ACB-E5FE-4EC4-81A1-6EF924792416}"/>
+                        </a:ext>
+                      </a:extLst>
+                    </p:cNvPr>
+                    <p:cNvSpPr txBox="1"/>
+                    <p:nvPr/>
+                  </p:nvSpPr>
+                  <p:spPr>
+                    <a:xfrm>
+                      <a:off x="1005256" y="18701314"/>
+                      <a:ext cx="4800600" cy="486490"/>
+                    </a:xfrm>
+                    <a:prstGeom prst="rect">
+                      <a:avLst/>
+                    </a:prstGeom>
+                    <a:noFill/>
+                  </p:spPr>
+                  <p:txBody>
+                    <a:bodyPr wrap="square" lIns="0" tIns="0" rIns="0" bIns="0" rtlCol="0">
+                      <a:spAutoFit/>
+                    </a:bodyPr>
+                    <a:lstStyle/>
+                    <a:p>
+                      <a:pPr/>
+                      <a14:m>
+                        <m:oMathPara xmlns:m="http://schemas.openxmlformats.org/officeDocument/2006/math">
+                          <m:oMathParaPr>
+                            <m:jc m:val="left"/>
+                          </m:oMathParaPr>
+                          <m:oMath xmlns:m="http://schemas.openxmlformats.org/officeDocument/2006/math">
+                            <m:m>
+                              <m:mPr>
+                                <m:mcs>
+                                  <m:mc>
+                                    <m:mcPr>
+                                      <m:count m:val="1"/>
+                                      <m:mcJc m:val="center"/>
+                                    </m:mcPr>
+                                  </m:mc>
+                                </m:mcs>
+                                <m:ctrlPr>
+                                  <a:rPr lang="en-US" sz="2800" b="0" i="1" smtClean="0">
+                                    <a:latin typeface="Cambria Math" panose="02040503050406030204" pitchFamily="18" charset="0"/>
+                                  </a:rPr>
+                                </m:ctrlPr>
+                              </m:mPr>
+                              <m:mr>
+                                <m:e>
+                                  <m:acc>
+                                    <m:accPr>
+                                      <m:chr m:val="̇"/>
+                                      <m:ctrlPr>
+                                        <a:rPr lang="en-US" sz="2800" b="0" i="1" smtClean="0">
+                                          <a:latin typeface="Cambria Math" panose="02040503050406030204" pitchFamily="18" charset="0"/>
+                                        </a:rPr>
+                                      </m:ctrlPr>
+                                    </m:accPr>
+                                    <m:e>
+                                      <m:r>
+                                        <a:rPr lang="en-US" sz="2800" b="0" i="1" smtClean="0">
+                                          <a:latin typeface="Cambria Math" panose="02040503050406030204" pitchFamily="18" charset="0"/>
+                                        </a:rPr>
+                                        <m:t>𝐷</m:t>
+                                      </m:r>
+                                    </m:e>
+                                  </m:acc>
+                                  <m:r>
+                                    <m:rPr>
+                                      <m:brk m:alnAt="7"/>
+                                    </m:rPr>
+                                    <a:rPr lang="en-US" sz="2800" b="0" i="1" smtClean="0">
+                                      <a:latin typeface="Cambria Math" panose="02040503050406030204" pitchFamily="18" charset="0"/>
+                                    </a:rPr>
+                                    <m:t>=</m:t>
+                                  </m:r>
+                                  <m:r>
+                                    <a:rPr lang="en-US" sz="2800" b="0" i="1" smtClean="0">
+                                      <a:latin typeface="Cambria Math" panose="02040503050406030204" pitchFamily="18" charset="0"/>
+                                    </a:rPr>
+                                    <m:t>𝜈</m:t>
+                                  </m:r>
+                                  <m:r>
+                                    <a:rPr lang="en-US" sz="2800" i="1">
+                                      <a:latin typeface="Cambria Math" panose="02040503050406030204" pitchFamily="18" charset="0"/>
+                                    </a:rPr>
+                                    <m:t>𝐼</m:t>
+                                  </m:r>
+                                </m:e>
+                              </m:mr>
+                            </m:m>
+                          </m:oMath>
+                        </m:oMathPara>
+                      </a14:m>
+                      <a:endParaRPr lang="en-US" sz="2800" dirty="0"/>
+                    </a:p>
+                  </p:txBody>
+                </p:sp>
+              </mc:Choice>
+              <mc:Fallback xmlns="">
+                <p:sp>
+                  <p:nvSpPr>
+                    <p:cNvPr id="184" name="TextBox 183">
+                      <a:extLst>
+                        <a:ext uri="{FF2B5EF4-FFF2-40B4-BE49-F238E27FC236}">
+                          <a16:creationId xmlns:a16="http://schemas.microsoft.com/office/drawing/2014/main" id="{64F74ACB-E5FE-4EC4-81A1-6EF924792416}"/>
+                        </a:ext>
+                      </a:extLst>
+                    </p:cNvPr>
+                    <p:cNvSpPr txBox="1">
+                      <a:spLocks noRot="1" noChangeAspect="1" noMove="1" noResize="1" noEditPoints="1" noAdjustHandles="1" noChangeArrowheads="1" noChangeShapeType="1" noTextEdit="1"/>
+                    </p:cNvSpPr>
+                    <p:nvPr/>
+                  </p:nvSpPr>
+                  <p:spPr>
+                    <a:xfrm>
+                      <a:off x="1005256" y="18701314"/>
+                      <a:ext cx="4800600" cy="486490"/>
+                    </a:xfrm>
+                    <a:prstGeom prst="rect">
+                      <a:avLst/>
+                    </a:prstGeom>
+                    <a:blipFill>
+                      <a:blip r:embed="rId26"/>
+                      <a:stretch>
+                        <a:fillRect/>
+                      </a:stretch>
+                    </a:blipFill>
+                  </p:spPr>
+                  <p:txBody>
+                    <a:bodyPr/>
+                    <a:lstStyle/>
+                    <a:p>
+                      <a:r>
+                        <a:rPr lang="en-US">
+                          <a:noFill/>
+                        </a:rPr>
+                        <a:t> </a:t>
+                      </a:r>
+                    </a:p>
+                  </p:txBody>
+                </p:sp>
+              </mc:Fallback>
+            </mc:AlternateContent>
+            <mc:AlternateContent xmlns:mc="http://schemas.openxmlformats.org/markup-compatibility/2006" xmlns:a14="http://schemas.microsoft.com/office/drawing/2010/main">
+              <mc:Choice Requires="a14">
+                <p:sp>
+                  <p:nvSpPr>
+                    <p:cNvPr id="185" name="TextBox 184">
+                      <a:extLst>
+                        <a:ext uri="{FF2B5EF4-FFF2-40B4-BE49-F238E27FC236}">
+                          <a16:creationId xmlns:a16="http://schemas.microsoft.com/office/drawing/2014/main" id="{A88A7A01-EEA8-40FE-A0E7-59FD28DD25EB}"/>
+                        </a:ext>
+                      </a:extLst>
+                    </p:cNvPr>
+                    <p:cNvSpPr txBox="1"/>
+                    <p:nvPr/>
+                  </p:nvSpPr>
+                  <p:spPr>
+                    <a:xfrm>
+                      <a:off x="1021372" y="16794548"/>
+                      <a:ext cx="4571999" cy="922015"/>
+                    </a:xfrm>
+                    <a:prstGeom prst="rect">
+                      <a:avLst/>
+                    </a:prstGeom>
+                    <a:noFill/>
+                  </p:spPr>
+                  <p:txBody>
+                    <a:bodyPr wrap="square" lIns="0" tIns="0" rIns="0" bIns="0" rtlCol="0">
+                      <a:spAutoFit/>
+                    </a:bodyPr>
+                    <a:lstStyle/>
+                    <a:p>
+                      <a:pPr/>
+                      <a14:m>
+                        <m:oMathPara xmlns:m="http://schemas.openxmlformats.org/officeDocument/2006/math">
+                          <m:oMathParaPr>
+                            <m:jc m:val="left"/>
+                          </m:oMathParaPr>
+                          <m:oMath xmlns:m="http://schemas.openxmlformats.org/officeDocument/2006/math">
+                            <m:m>
+                              <m:mPr>
+                                <m:mcs>
+                                  <m:mc>
+                                    <m:mcPr>
+                                      <m:count m:val="1"/>
+                                      <m:mcJc m:val="center"/>
+                                    </m:mcPr>
+                                  </m:mc>
+                                </m:mcs>
+                                <m:ctrlPr>
+                                  <a:rPr lang="en-US" sz="2800" b="0" i="1" smtClean="0">
+                                    <a:latin typeface="Cambria Math" panose="02040503050406030204" pitchFamily="18" charset="0"/>
+                                  </a:rPr>
+                                </m:ctrlPr>
+                              </m:mPr>
+                              <m:mr>
+                                <m:e>
+                                  <m:acc>
+                                    <m:accPr>
+                                      <m:chr m:val="̇"/>
+                                      <m:ctrlPr>
+                                        <a:rPr lang="en-US" sz="2800" b="0" i="1" smtClean="0">
+                                          <a:latin typeface="Cambria Math" panose="02040503050406030204" pitchFamily="18" charset="0"/>
+                                        </a:rPr>
+                                      </m:ctrlPr>
+                                    </m:accPr>
+                                    <m:e>
+                                      <m:r>
+                                        <a:rPr lang="en-US" sz="2800" b="0" i="1" smtClean="0">
+                                          <a:latin typeface="Cambria Math" panose="02040503050406030204" pitchFamily="18" charset="0"/>
+                                        </a:rPr>
+                                        <m:t>𝐼</m:t>
+                                      </m:r>
+                                    </m:e>
+                                  </m:acc>
+                                  <m:r>
+                                    <m:rPr>
+                                      <m:brk m:alnAt="7"/>
+                                    </m:rPr>
+                                    <a:rPr lang="en-US" sz="2800" b="0" i="1" smtClean="0">
+                                      <a:latin typeface="Cambria Math" panose="02040503050406030204" pitchFamily="18" charset="0"/>
+                                    </a:rPr>
+                                    <m:t>=</m:t>
+                                  </m:r>
+                                  <m:r>
+                                    <a:rPr lang="en-US" sz="2800" i="1">
+                                      <a:latin typeface="Cambria Math" panose="02040503050406030204" pitchFamily="18" charset="0"/>
+                                    </a:rPr>
+                                    <m:t>𝛽</m:t>
+                                  </m:r>
+                                  <m:d>
+                                    <m:dPr>
+                                      <m:ctrlPr>
+                                        <a:rPr lang="en-US" sz="2800" i="1" smtClean="0">
+                                          <a:latin typeface="Cambria Math" panose="02040503050406030204" pitchFamily="18" charset="0"/>
+                                        </a:rPr>
+                                      </m:ctrlPr>
+                                    </m:dPr>
+                                    <m:e>
+                                      <m:r>
+                                        <a:rPr lang="en-US" sz="2800" b="0" i="1" smtClean="0">
+                                          <a:latin typeface="Cambria Math" panose="02040503050406030204" pitchFamily="18" charset="0"/>
+                                        </a:rPr>
+                                        <m:t>𝐼</m:t>
+                                      </m:r>
+                                    </m:e>
+                                  </m:d>
+                                  <m:f>
+                                    <m:fPr>
+                                      <m:ctrlPr>
+                                        <a:rPr lang="en-US" sz="2800" i="1">
+                                          <a:latin typeface="Cambria Math" panose="02040503050406030204" pitchFamily="18" charset="0"/>
+                                        </a:rPr>
+                                      </m:ctrlPr>
+                                    </m:fPr>
+                                    <m:num>
+                                      <m:r>
+                                        <a:rPr lang="en-US" sz="2800" i="1">
+                                          <a:latin typeface="Cambria Math" panose="02040503050406030204" pitchFamily="18" charset="0"/>
+                                        </a:rPr>
+                                        <m:t>𝑆𝐼</m:t>
+                                      </m:r>
+                                    </m:num>
+                                    <m:den>
+                                      <m:r>
+                                        <a:rPr lang="en-US" sz="2800" i="1">
+                                          <a:latin typeface="Cambria Math" panose="02040503050406030204" pitchFamily="18" charset="0"/>
+                                        </a:rPr>
+                                        <m:t>𝑆</m:t>
+                                      </m:r>
+                                      <m:r>
+                                        <a:rPr lang="en-US" sz="2800" i="1">
+                                          <a:latin typeface="Cambria Math" panose="02040503050406030204" pitchFamily="18" charset="0"/>
+                                        </a:rPr>
+                                        <m:t>+</m:t>
+                                      </m:r>
+                                      <m:r>
+                                        <a:rPr lang="en-US" sz="2800" i="1">
+                                          <a:latin typeface="Cambria Math" panose="02040503050406030204" pitchFamily="18" charset="0"/>
+                                        </a:rPr>
+                                        <m:t>𝐼</m:t>
+                                      </m:r>
+                                    </m:den>
+                                  </m:f>
+                                  <m:r>
+                                    <a:rPr lang="en-US" sz="2800" i="1">
+                                      <a:latin typeface="Cambria Math" panose="02040503050406030204" pitchFamily="18" charset="0"/>
+                                    </a:rPr>
+                                    <m:t>−</m:t>
+                                  </m:r>
+                                  <m:r>
+                                    <a:rPr lang="en-US" sz="2800" i="1">
+                                      <a:latin typeface="Cambria Math" panose="02040503050406030204" pitchFamily="18" charset="0"/>
+                                    </a:rPr>
+                                    <m:t>𝛾</m:t>
+                                  </m:r>
+                                  <m:r>
+                                    <a:rPr lang="en-US" sz="2800" i="1">
+                                      <a:latin typeface="Cambria Math" panose="02040503050406030204" pitchFamily="18" charset="0"/>
+                                    </a:rPr>
+                                    <m:t>𝐼</m:t>
+                                  </m:r>
+                                  <m:r>
+                                    <a:rPr lang="en-US" sz="2800" i="1">
+                                      <a:latin typeface="Cambria Math" panose="02040503050406030204" pitchFamily="18" charset="0"/>
+                                    </a:rPr>
+                                    <m:t>−</m:t>
+                                  </m:r>
+                                  <m:r>
+                                    <a:rPr lang="en-US" sz="2800" b="0" i="1" smtClean="0">
+                                      <a:latin typeface="Cambria Math" panose="02040503050406030204" pitchFamily="18" charset="0"/>
+                                    </a:rPr>
+                                    <m:t>𝜈</m:t>
+                                  </m:r>
+                                  <m:r>
+                                    <a:rPr lang="en-US" sz="2800" i="1">
+                                      <a:latin typeface="Cambria Math" panose="02040503050406030204" pitchFamily="18" charset="0"/>
+                                    </a:rPr>
+                                    <m:t>𝐼</m:t>
+                                  </m:r>
+                                </m:e>
+                              </m:mr>
+                            </m:m>
+                          </m:oMath>
+                        </m:oMathPara>
+                      </a14:m>
+                      <a:endParaRPr lang="en-US" sz="2800" dirty="0"/>
+                    </a:p>
+                  </p:txBody>
+                </p:sp>
+              </mc:Choice>
+              <mc:Fallback xmlns="">
+                <p:sp>
+                  <p:nvSpPr>
+                    <p:cNvPr id="185" name="TextBox 184">
+                      <a:extLst>
+                        <a:ext uri="{FF2B5EF4-FFF2-40B4-BE49-F238E27FC236}">
+                          <a16:creationId xmlns:a16="http://schemas.microsoft.com/office/drawing/2014/main" id="{A88A7A01-EEA8-40FE-A0E7-59FD28DD25EB}"/>
+                        </a:ext>
+                      </a:extLst>
+                    </p:cNvPr>
+                    <p:cNvSpPr txBox="1">
+                      <a:spLocks noRot="1" noChangeAspect="1" noMove="1" noResize="1" noEditPoints="1" noAdjustHandles="1" noChangeArrowheads="1" noChangeShapeType="1" noTextEdit="1"/>
+                    </p:cNvSpPr>
+                    <p:nvPr/>
+                  </p:nvSpPr>
+                  <p:spPr>
+                    <a:xfrm>
+                      <a:off x="1021372" y="16794548"/>
+                      <a:ext cx="4571999" cy="922015"/>
+                    </a:xfrm>
+                    <a:prstGeom prst="rect">
+                      <a:avLst/>
+                    </a:prstGeom>
+                    <a:blipFill>
+                      <a:blip r:embed="rId27"/>
+                      <a:stretch>
+                        <a:fillRect/>
+                      </a:stretch>
+                    </a:blipFill>
+                  </p:spPr>
+                  <p:txBody>
+                    <a:bodyPr/>
+                    <a:lstStyle/>
+                    <a:p>
+                      <a:r>
+                        <a:rPr lang="en-US">
+                          <a:noFill/>
+                        </a:rPr>
+                        <a:t> </a:t>
+                      </a:r>
+                    </a:p>
+                  </p:txBody>
+                </p:sp>
+              </mc:Fallback>
+            </mc:AlternateContent>
+            <mc:AlternateContent xmlns:mc="http://schemas.openxmlformats.org/markup-compatibility/2006" xmlns:a14="http://schemas.microsoft.com/office/drawing/2010/main">
+              <mc:Choice Requires="a14">
+                <p:sp>
+                  <p:nvSpPr>
+                    <p:cNvPr id="186" name="TextBox 185">
+                      <a:extLst>
+                        <a:ext uri="{FF2B5EF4-FFF2-40B4-BE49-F238E27FC236}">
+                          <a16:creationId xmlns:a16="http://schemas.microsoft.com/office/drawing/2014/main" id="{C3A44E2C-6F65-49A8-91C2-7947D4A500F3}"/>
+                        </a:ext>
+                      </a:extLst>
+                    </p:cNvPr>
+                    <p:cNvSpPr txBox="1"/>
+                    <p:nvPr/>
+                  </p:nvSpPr>
+                  <p:spPr>
+                    <a:xfrm>
+                      <a:off x="1042705" y="15678897"/>
+                      <a:ext cx="4800601" cy="922015"/>
+                    </a:xfrm>
+                    <a:prstGeom prst="rect">
+                      <a:avLst/>
+                    </a:prstGeom>
+                    <a:noFill/>
+                  </p:spPr>
+                  <p:txBody>
+                    <a:bodyPr wrap="square" lIns="0" tIns="0" rIns="0" bIns="0" rtlCol="0">
+                      <a:spAutoFit/>
+                    </a:bodyPr>
+                    <a:lstStyle/>
+                    <a:p>
+                      <a:pPr/>
+                      <a14:m>
+                        <m:oMathPara xmlns:m="http://schemas.openxmlformats.org/officeDocument/2006/math">
+                          <m:oMathParaPr>
+                            <m:jc m:val="left"/>
+                          </m:oMathParaPr>
+                          <m:oMath xmlns:m="http://schemas.openxmlformats.org/officeDocument/2006/math">
+                            <m:m>
+                              <m:mPr>
+                                <m:mcs>
+                                  <m:mc>
+                                    <m:mcPr>
+                                      <m:count m:val="1"/>
+                                      <m:mcJc m:val="center"/>
+                                    </m:mcPr>
+                                  </m:mc>
+                                </m:mcs>
+                                <m:ctrlPr>
+                                  <a:rPr lang="en-US" sz="2800" b="0" i="1" smtClean="0">
+                                    <a:latin typeface="Cambria Math" panose="02040503050406030204" pitchFamily="18" charset="0"/>
+                                  </a:rPr>
+                                </m:ctrlPr>
+                              </m:mPr>
+                              <m:mr>
+                                <m:e>
+                                  <m:acc>
+                                    <m:accPr>
+                                      <m:chr m:val="̇"/>
+                                      <m:ctrlPr>
+                                        <a:rPr lang="en-US" sz="2800" b="0" i="1" smtClean="0">
+                                          <a:latin typeface="Cambria Math" panose="02040503050406030204" pitchFamily="18" charset="0"/>
+                                        </a:rPr>
+                                      </m:ctrlPr>
+                                    </m:accPr>
+                                    <m:e>
+                                      <m:r>
+                                        <a:rPr lang="en-US" sz="2800" b="0" i="1" smtClean="0">
+                                          <a:latin typeface="Cambria Math" panose="02040503050406030204" pitchFamily="18" charset="0"/>
+                                        </a:rPr>
+                                        <m:t>𝑆</m:t>
+                                      </m:r>
+                                    </m:e>
+                                  </m:acc>
+                                  <m:r>
+                                    <m:rPr>
+                                      <m:brk m:alnAt="7"/>
+                                    </m:rPr>
+                                    <a:rPr lang="en-US" sz="2800" b="0" i="1" smtClean="0">
+                                      <a:latin typeface="Cambria Math" panose="02040503050406030204" pitchFamily="18" charset="0"/>
+                                    </a:rPr>
+                                    <m:t>=</m:t>
+                                  </m:r>
+                                  <m:r>
+                                    <a:rPr lang="en-US" sz="2800" b="0" i="1" smtClean="0">
+                                      <a:latin typeface="Cambria Math" panose="02040503050406030204" pitchFamily="18" charset="0"/>
+                                    </a:rPr>
+                                    <m:t>−</m:t>
+                                  </m:r>
+                                  <m:r>
+                                    <a:rPr lang="en-US" sz="2800" i="1">
+                                      <a:latin typeface="Cambria Math" panose="02040503050406030204" pitchFamily="18" charset="0"/>
+                                    </a:rPr>
+                                    <m:t>𝛽</m:t>
+                                  </m:r>
+                                  <m:d>
+                                    <m:dPr>
+                                      <m:ctrlPr>
+                                        <a:rPr lang="en-US" sz="2800" i="1" smtClean="0">
+                                          <a:latin typeface="Cambria Math" panose="02040503050406030204" pitchFamily="18" charset="0"/>
+                                        </a:rPr>
+                                      </m:ctrlPr>
+                                    </m:dPr>
+                                    <m:e>
+                                      <m:r>
+                                        <a:rPr lang="en-US" sz="2800" b="0" i="1" smtClean="0">
+                                          <a:latin typeface="Cambria Math" panose="02040503050406030204" pitchFamily="18" charset="0"/>
+                                        </a:rPr>
+                                        <m:t>𝐼</m:t>
+                                      </m:r>
+                                    </m:e>
+                                  </m:d>
+                                  <m:f>
+                                    <m:fPr>
+                                      <m:ctrlPr>
+                                        <a:rPr lang="en-US" sz="2800" i="1">
+                                          <a:latin typeface="Cambria Math" panose="02040503050406030204" pitchFamily="18" charset="0"/>
+                                        </a:rPr>
+                                      </m:ctrlPr>
+                                    </m:fPr>
+                                    <m:num>
+                                      <m:r>
+                                        <a:rPr lang="en-US" sz="2800" i="1">
+                                          <a:latin typeface="Cambria Math" panose="02040503050406030204" pitchFamily="18" charset="0"/>
+                                        </a:rPr>
+                                        <m:t>𝑆𝐼</m:t>
+                                      </m:r>
+                                    </m:num>
+                                    <m:den>
+                                      <m:r>
+                                        <a:rPr lang="en-US" sz="2800" i="1">
+                                          <a:latin typeface="Cambria Math" panose="02040503050406030204" pitchFamily="18" charset="0"/>
+                                        </a:rPr>
+                                        <m:t>𝑆</m:t>
+                                      </m:r>
+                                      <m:r>
+                                        <a:rPr lang="en-US" sz="2800" i="1">
+                                          <a:latin typeface="Cambria Math" panose="02040503050406030204" pitchFamily="18" charset="0"/>
+                                        </a:rPr>
+                                        <m:t>+</m:t>
+                                      </m:r>
+                                      <m:r>
+                                        <a:rPr lang="en-US" sz="2800" i="1">
+                                          <a:latin typeface="Cambria Math" panose="02040503050406030204" pitchFamily="18" charset="0"/>
+                                        </a:rPr>
+                                        <m:t>𝐼</m:t>
+                                      </m:r>
+                                    </m:den>
+                                  </m:f>
+                                  <m:r>
+                                    <a:rPr lang="en-US" sz="2800" b="0" i="1" smtClean="0">
+                                      <a:latin typeface="Cambria Math" panose="02040503050406030204" pitchFamily="18" charset="0"/>
+                                    </a:rPr>
+                                    <m:t>−</m:t>
+                                  </m:r>
+                                  <m:r>
+                                    <a:rPr lang="en-US" sz="2800" b="0" i="1" smtClean="0">
+                                      <a:latin typeface="Cambria Math" panose="02040503050406030204" pitchFamily="18" charset="0"/>
+                                    </a:rPr>
+                                    <m:t>𝛼</m:t>
+                                  </m:r>
+                                  <m:r>
+                                    <a:rPr lang="en-US" sz="2800" b="0" i="1" smtClean="0">
+                                      <a:solidFill>
+                                        <a:srgbClr val="C00000"/>
+                                      </a:solidFill>
+                                      <a:latin typeface="Cambria Math" panose="02040503050406030204" pitchFamily="18" charset="0"/>
+                                    </a:rPr>
+                                    <m:t>𝑉</m:t>
+                                  </m:r>
+                                </m:e>
+                              </m:mr>
+                            </m:m>
+                          </m:oMath>
+                        </m:oMathPara>
+                      </a14:m>
+                      <a:endParaRPr lang="en-US" sz="2800" dirty="0"/>
+                    </a:p>
+                  </p:txBody>
+                </p:sp>
+              </mc:Choice>
+              <mc:Fallback xmlns="">
+                <p:sp>
+                  <p:nvSpPr>
+                    <p:cNvPr id="186" name="TextBox 185">
+                      <a:extLst>
+                        <a:ext uri="{FF2B5EF4-FFF2-40B4-BE49-F238E27FC236}">
+                          <a16:creationId xmlns:a16="http://schemas.microsoft.com/office/drawing/2014/main" id="{C3A44E2C-6F65-49A8-91C2-7947D4A500F3}"/>
+                        </a:ext>
+                      </a:extLst>
+                    </p:cNvPr>
+                    <p:cNvSpPr txBox="1">
+                      <a:spLocks noRot="1" noChangeAspect="1" noMove="1" noResize="1" noEditPoints="1" noAdjustHandles="1" noChangeArrowheads="1" noChangeShapeType="1" noTextEdit="1"/>
+                    </p:cNvSpPr>
+                    <p:nvPr/>
+                  </p:nvSpPr>
+                  <p:spPr>
+                    <a:xfrm>
+                      <a:off x="1042705" y="15678897"/>
+                      <a:ext cx="4800601" cy="922015"/>
+                    </a:xfrm>
+                    <a:prstGeom prst="rect">
+                      <a:avLst/>
+                    </a:prstGeom>
+                    <a:blipFill>
+                      <a:blip r:embed="rId28"/>
+                      <a:stretch>
+                        <a:fillRect/>
+                      </a:stretch>
+                    </a:blipFill>
+                  </p:spPr>
+                  <p:txBody>
+                    <a:bodyPr/>
+                    <a:lstStyle/>
+                    <a:p>
+                      <a:r>
+                        <a:rPr lang="en-US">
+                          <a:noFill/>
+                        </a:rPr>
+                        <a:t> </a:t>
+                      </a:r>
+                    </a:p>
+                  </p:txBody>
+                </p:sp>
+              </mc:Fallback>
+            </mc:AlternateContent>
+            <mc:AlternateContent xmlns:mc="http://schemas.openxmlformats.org/markup-compatibility/2006" xmlns:a14="http://schemas.microsoft.com/office/drawing/2010/main">
+              <mc:Choice Requires="a14">
+                <p:sp>
+                  <p:nvSpPr>
+                    <p:cNvPr id="187" name="TextBox 186">
+                      <a:extLst>
+                        <a:ext uri="{FF2B5EF4-FFF2-40B4-BE49-F238E27FC236}">
+                          <a16:creationId xmlns:a16="http://schemas.microsoft.com/office/drawing/2014/main" id="{25E3899D-5F9E-4668-90AC-A98A7F6C49A4}"/>
+                        </a:ext>
+                      </a:extLst>
+                    </p:cNvPr>
+                    <p:cNvSpPr txBox="1"/>
+                    <p:nvPr/>
+                  </p:nvSpPr>
+                  <p:spPr>
+                    <a:xfrm>
+                      <a:off x="1012466" y="17927276"/>
+                      <a:ext cx="4800600" cy="491051"/>
+                    </a:xfrm>
+                    <a:prstGeom prst="rect">
+                      <a:avLst/>
+                    </a:prstGeom>
+                    <a:noFill/>
+                  </p:spPr>
+                  <p:txBody>
+                    <a:bodyPr wrap="square" lIns="0" tIns="0" rIns="0" bIns="0" rtlCol="0">
+                      <a:spAutoFit/>
+                    </a:bodyPr>
+                    <a:lstStyle/>
+                    <a:p>
+                      <a:pPr/>
+                      <a14:m>
+                        <m:oMathPara xmlns:m="http://schemas.openxmlformats.org/officeDocument/2006/math">
+                          <m:oMathParaPr>
+                            <m:jc m:val="left"/>
+                          </m:oMathParaPr>
+                          <m:oMath xmlns:m="http://schemas.openxmlformats.org/officeDocument/2006/math">
+                            <m:m>
+                              <m:mPr>
+                                <m:mcs>
+                                  <m:mc>
+                                    <m:mcPr>
+                                      <m:count m:val="1"/>
+                                      <m:mcJc m:val="center"/>
+                                    </m:mcPr>
+                                  </m:mc>
+                                </m:mcs>
+                                <m:ctrlPr>
+                                  <a:rPr lang="en-US" sz="2800" b="0" i="1" smtClean="0">
+                                    <a:latin typeface="Cambria Math" panose="02040503050406030204" pitchFamily="18" charset="0"/>
+                                  </a:rPr>
+                                </m:ctrlPr>
+                              </m:mPr>
+                              <m:mr>
+                                <m:e>
+                                  <m:acc>
+                                    <m:accPr>
+                                      <m:chr m:val="̇"/>
+                                      <m:ctrlPr>
+                                        <a:rPr lang="en-US" sz="2800" b="0" i="1" smtClean="0">
+                                          <a:latin typeface="Cambria Math" panose="02040503050406030204" pitchFamily="18" charset="0"/>
+                                        </a:rPr>
+                                      </m:ctrlPr>
+                                    </m:accPr>
+                                    <m:e>
+                                      <m:r>
+                                        <a:rPr lang="en-US" sz="2800" b="0" i="1" smtClean="0">
+                                          <a:latin typeface="Cambria Math" panose="02040503050406030204" pitchFamily="18" charset="0"/>
+                                        </a:rPr>
+                                        <m:t>𝑅</m:t>
+                                      </m:r>
+                                    </m:e>
+                                  </m:acc>
+                                  <m:r>
+                                    <m:rPr>
+                                      <m:brk m:alnAt="7"/>
+                                    </m:rPr>
+                                    <a:rPr lang="en-US" sz="2800" b="0" i="1" smtClean="0">
+                                      <a:latin typeface="Cambria Math" panose="02040503050406030204" pitchFamily="18" charset="0"/>
+                                    </a:rPr>
+                                    <m:t>=</m:t>
+                                  </m:r>
+                                  <m:r>
+                                    <a:rPr lang="en-US" sz="2800" i="1">
+                                      <a:latin typeface="Cambria Math" panose="02040503050406030204" pitchFamily="18" charset="0"/>
+                                    </a:rPr>
+                                    <m:t>𝛾</m:t>
+                                  </m:r>
+                                  <m:r>
+                                    <a:rPr lang="en-US" sz="2800" i="1">
+                                      <a:latin typeface="Cambria Math" panose="02040503050406030204" pitchFamily="18" charset="0"/>
+                                    </a:rPr>
+                                    <m:t>𝐼</m:t>
+                                  </m:r>
+                                  <m:r>
+                                    <a:rPr lang="en-US" sz="2800" b="0" i="1" smtClean="0">
+                                      <a:latin typeface="Cambria Math" panose="02040503050406030204" pitchFamily="18" charset="0"/>
+                                    </a:rPr>
+                                    <m:t>−</m:t>
+                                  </m:r>
+                                  <m:d>
+                                    <m:dPr>
+                                      <m:ctrlPr>
+                                        <a:rPr lang="en-US" sz="2800" b="0" i="1" smtClean="0">
+                                          <a:latin typeface="Cambria Math" panose="02040503050406030204" pitchFamily="18" charset="0"/>
+                                        </a:rPr>
+                                      </m:ctrlPr>
+                                    </m:dPr>
+                                    <m:e>
+                                      <m:r>
+                                        <a:rPr lang="en-US" sz="2800" b="0" i="1" smtClean="0">
+                                          <a:latin typeface="Cambria Math" panose="02040503050406030204" pitchFamily="18" charset="0"/>
+                                        </a:rPr>
+                                        <m:t>1−</m:t>
+                                      </m:r>
+                                      <m:r>
+                                        <a:rPr lang="en-US" sz="2800" b="0" i="1" smtClean="0">
+                                          <a:latin typeface="Cambria Math" panose="02040503050406030204" pitchFamily="18" charset="0"/>
+                                        </a:rPr>
+                                        <m:t>𝛼</m:t>
+                                      </m:r>
+                                    </m:e>
+                                  </m:d>
+                                  <m:r>
+                                    <a:rPr lang="en-US" sz="2800" b="0" i="1" smtClean="0">
+                                      <a:solidFill>
+                                        <a:srgbClr val="C00000"/>
+                                      </a:solidFill>
+                                      <a:latin typeface="Cambria Math" panose="02040503050406030204" pitchFamily="18" charset="0"/>
+                                    </a:rPr>
+                                    <m:t>𝑉</m:t>
+                                  </m:r>
+                                </m:e>
+                              </m:mr>
+                            </m:m>
+                          </m:oMath>
+                        </m:oMathPara>
+                      </a14:m>
+                      <a:endParaRPr lang="en-US" sz="2800" dirty="0"/>
+                    </a:p>
+                  </p:txBody>
+                </p:sp>
+              </mc:Choice>
+              <mc:Fallback xmlns="">
+                <p:sp>
+                  <p:nvSpPr>
+                    <p:cNvPr id="187" name="TextBox 186">
+                      <a:extLst>
+                        <a:ext uri="{FF2B5EF4-FFF2-40B4-BE49-F238E27FC236}">
+                          <a16:creationId xmlns:a16="http://schemas.microsoft.com/office/drawing/2014/main" id="{25E3899D-5F9E-4668-90AC-A98A7F6C49A4}"/>
+                        </a:ext>
+                      </a:extLst>
+                    </p:cNvPr>
+                    <p:cNvSpPr txBox="1">
+                      <a:spLocks noRot="1" noChangeAspect="1" noMove="1" noResize="1" noEditPoints="1" noAdjustHandles="1" noChangeArrowheads="1" noChangeShapeType="1" noTextEdit="1"/>
+                    </p:cNvSpPr>
+                    <p:nvPr/>
+                  </p:nvSpPr>
+                  <p:spPr>
+                    <a:xfrm>
+                      <a:off x="1012466" y="17927276"/>
+                      <a:ext cx="4800600" cy="491051"/>
+                    </a:xfrm>
+                    <a:prstGeom prst="rect">
+                      <a:avLst/>
+                    </a:prstGeom>
+                    <a:blipFill>
+                      <a:blip r:embed="rId29"/>
+                      <a:stretch>
+                        <a:fillRect/>
+                      </a:stretch>
+                    </a:blipFill>
+                  </p:spPr>
+                  <p:txBody>
+                    <a:bodyPr/>
+                    <a:lstStyle/>
+                    <a:p>
+                      <a:r>
+                        <a:rPr lang="en-US">
+                          <a:noFill/>
+                        </a:rPr>
+                        <a:t> </a:t>
+                      </a:r>
+                    </a:p>
+                  </p:txBody>
+                </p:sp>
+              </mc:Fallback>
+            </mc:AlternateContent>
+          </p:grpSp>
+          <p:sp>
+            <p:nvSpPr>
+              <p:cNvPr id="182" name="Right Arrow 91">
+                <a:extLst>
+                  <a:ext uri="{FF2B5EF4-FFF2-40B4-BE49-F238E27FC236}">
+                    <a16:creationId xmlns:a16="http://schemas.microsoft.com/office/drawing/2014/main" id="{E3FD093D-CA80-4FEC-831C-EB3FA2D08234}"/>
+                  </a:ext>
+                </a:extLst>
+              </p:cNvPr>
+              <p:cNvSpPr/>
+              <p:nvPr/>
+            </p:nvSpPr>
+            <p:spPr>
+              <a:xfrm>
+                <a:off x="7449459" y="2679405"/>
+                <a:ext cx="354923" cy="597909"/>
+              </a:xfrm>
+              <a:prstGeom prst="rightArrow">
+                <a:avLst/>
+              </a:prstGeom>
+            </p:spPr>
+            <p:style>
+              <a:lnRef idx="2">
+                <a:schemeClr val="accent1">
+                  <a:shade val="50000"/>
+                </a:schemeClr>
+              </a:lnRef>
+              <a:fillRef idx="1">
+                <a:schemeClr val="accent1"/>
+              </a:fillRef>
+              <a:effectRef idx="0">
+                <a:schemeClr val="accent1"/>
+              </a:effectRef>
+              <a:fontRef idx="minor">
+                <a:schemeClr val="lt1"/>
+              </a:fontRef>
+            </p:style>
+            <p:txBody>
+              <a:bodyPr rtlCol="0" anchor="ctr"/>
+              <a:lstStyle/>
+              <a:p>
+                <a:pPr algn="ctr"/>
+                <a:endParaRPr lang="en-US"/>
+              </a:p>
+            </p:txBody>
+          </p:sp>
+        </p:grpSp>
+        <p:sp>
+          <p:nvSpPr>
+            <p:cNvPr id="6" name="Rectangle 5"/>
+            <p:cNvSpPr/>
+            <p:nvPr/>
+          </p:nvSpPr>
+          <p:spPr>
+            <a:xfrm>
+              <a:off x="30409791" y="8375224"/>
+              <a:ext cx="2088457" cy="584775"/>
+            </a:xfrm>
+            <a:prstGeom prst="rect">
+              <a:avLst/>
+            </a:prstGeom>
+          </p:spPr>
+          <p:txBody>
+            <a:bodyPr wrap="none">
+              <a:spAutoFit/>
+            </a:bodyPr>
+            <a:lstStyle/>
+            <a:p>
+              <a:r>
+                <a:rPr lang="en-US" sz="3200" dirty="0">
+                  <a:solidFill>
+                    <a:prstClr val="black"/>
+                  </a:solidFill>
+                  <a:latin typeface="Calibri"/>
+                  <a:cs typeface="Arial" pitchFamily="34" charset="0"/>
+                </a:rPr>
+                <a:t>Vaccinated </a:t>
+              </a:r>
+              <a:endParaRPr lang="en-US" dirty="0"/>
+            </a:p>
+          </p:txBody>
+        </p:sp>
+        <p:sp>
+          <p:nvSpPr>
+            <p:cNvPr id="134" name="Rectangle 133"/>
+            <p:cNvSpPr/>
+            <p:nvPr/>
+          </p:nvSpPr>
+          <p:spPr>
+            <a:xfrm>
+              <a:off x="40080539" y="8324393"/>
+              <a:ext cx="1640770" cy="584775"/>
+            </a:xfrm>
+            <a:prstGeom prst="rect">
+              <a:avLst/>
+            </a:prstGeom>
+          </p:spPr>
+          <p:txBody>
+            <a:bodyPr wrap="none">
+              <a:spAutoFit/>
+            </a:bodyPr>
+            <a:lstStyle/>
+            <a:p>
+              <a:r>
+                <a:rPr lang="en-US" sz="3200" dirty="0">
+                  <a:solidFill>
+                    <a:prstClr val="black"/>
+                  </a:solidFill>
+                  <a:latin typeface="Calibri"/>
+                  <a:cs typeface="Arial" pitchFamily="34" charset="0"/>
+                </a:rPr>
+                <a:t>Infected </a:t>
+              </a:r>
+              <a:endParaRPr lang="en-US" dirty="0"/>
+            </a:p>
+          </p:txBody>
+        </p:sp>
+      </p:grpSp>
     </p:spTree>
   </p:cSld>
   <p:clrMapOvr>

</xml_diff>